<commit_message>
Removed datacamp intro as per john
</commit_message>
<xml_diff>
--- a/Class 5 Slides.pptx
+++ b/Class 5 Slides.pptx
@@ -5,35 +5,34 @@
     <p:sldMasterId id="2147483659" r:id="rId1"/>
   </p:sldMasterIdLst>
   <p:notesMasterIdLst>
-    <p:notesMasterId r:id="rId18"/>
+    <p:notesMasterId r:id="rId17"/>
   </p:notesMasterIdLst>
   <p:sldIdLst>
     <p:sldId id="256" r:id="rId2"/>
     <p:sldId id="259" r:id="rId3"/>
     <p:sldId id="260" r:id="rId4"/>
-    <p:sldId id="261" r:id="rId5"/>
-    <p:sldId id="264" r:id="rId6"/>
-    <p:sldId id="265" r:id="rId7"/>
-    <p:sldId id="266" r:id="rId8"/>
-    <p:sldId id="273" r:id="rId9"/>
-    <p:sldId id="274" r:id="rId10"/>
-    <p:sldId id="267" r:id="rId11"/>
-    <p:sldId id="268" r:id="rId12"/>
-    <p:sldId id="270" r:id="rId13"/>
-    <p:sldId id="271" r:id="rId14"/>
-    <p:sldId id="269" r:id="rId15"/>
-    <p:sldId id="272" r:id="rId16"/>
-    <p:sldId id="285" r:id="rId17"/>
+    <p:sldId id="264" r:id="rId5"/>
+    <p:sldId id="265" r:id="rId6"/>
+    <p:sldId id="266" r:id="rId7"/>
+    <p:sldId id="273" r:id="rId8"/>
+    <p:sldId id="274" r:id="rId9"/>
+    <p:sldId id="267" r:id="rId10"/>
+    <p:sldId id="268" r:id="rId11"/>
+    <p:sldId id="270" r:id="rId12"/>
+    <p:sldId id="271" r:id="rId13"/>
+    <p:sldId id="269" r:id="rId14"/>
+    <p:sldId id="272" r:id="rId15"/>
+    <p:sldId id="285" r:id="rId16"/>
   </p:sldIdLst>
   <p:sldSz cx="9144000" cy="5143500" type="screen16x9"/>
   <p:notesSz cx="6858000" cy="9144000"/>
   <p:embeddedFontLst>
     <p:embeddedFont>
       <p:font typeface="Roboto" panose="02000000000000000000" pitchFamily="2" charset="0"/>
-      <p:regular r:id="rId19"/>
-      <p:bold r:id="rId20"/>
-      <p:italic r:id="rId21"/>
-      <p:boldItalic r:id="rId22"/>
+      <p:regular r:id="rId18"/>
+      <p:bold r:id="rId19"/>
+      <p:italic r:id="rId20"/>
+      <p:boldItalic r:id="rId21"/>
     </p:embeddedFont>
   </p:embeddedFontLst>
   <p:defaultTextStyle>
@@ -921,7 +920,7 @@
     </p:spTree>
     <p:extLst>
       <p:ext uri="{BB962C8B-B14F-4D97-AF65-F5344CB8AC3E}">
-        <p14:creationId xmlns:p14="http://schemas.microsoft.com/office/powerpoint/2010/main" val="3447910590"/>
+        <p14:creationId xmlns:p14="http://schemas.microsoft.com/office/powerpoint/2010/main" val="2464496078"/>
       </p:ext>
     </p:extLst>
   </p:cSld>
@@ -1034,7 +1033,7 @@
     </p:spTree>
     <p:extLst>
       <p:ext uri="{BB962C8B-B14F-4D97-AF65-F5344CB8AC3E}">
-        <p14:creationId xmlns:p14="http://schemas.microsoft.com/office/powerpoint/2010/main" val="2464496078"/>
+        <p14:creationId xmlns:p14="http://schemas.microsoft.com/office/powerpoint/2010/main" val="1670712207"/>
       </p:ext>
     </p:extLst>
   </p:cSld>
@@ -1147,7 +1146,7 @@
     </p:spTree>
     <p:extLst>
       <p:ext uri="{BB962C8B-B14F-4D97-AF65-F5344CB8AC3E}">
-        <p14:creationId xmlns:p14="http://schemas.microsoft.com/office/powerpoint/2010/main" val="1670712207"/>
+        <p14:creationId xmlns:p14="http://schemas.microsoft.com/office/powerpoint/2010/main" val="3892860880"/>
       </p:ext>
     </p:extLst>
   </p:cSld>
@@ -1260,7 +1259,7 @@
     </p:spTree>
     <p:extLst>
       <p:ext uri="{BB962C8B-B14F-4D97-AF65-F5344CB8AC3E}">
-        <p14:creationId xmlns:p14="http://schemas.microsoft.com/office/powerpoint/2010/main" val="3892860880"/>
+        <p14:creationId xmlns:p14="http://schemas.microsoft.com/office/powerpoint/2010/main" val="4225417892"/>
       </p:ext>
     </p:extLst>
   </p:cSld>
@@ -1373,7 +1372,7 @@
     </p:spTree>
     <p:extLst>
       <p:ext uri="{BB962C8B-B14F-4D97-AF65-F5344CB8AC3E}">
-        <p14:creationId xmlns:p14="http://schemas.microsoft.com/office/powerpoint/2010/main" val="4225417892"/>
+        <p14:creationId xmlns:p14="http://schemas.microsoft.com/office/powerpoint/2010/main" val="2721490249"/>
       </p:ext>
     </p:extLst>
   </p:cSld>
@@ -1384,119 +1383,6 @@
 </file>
 
 <file path=ppt/notesSlides/notesSlide15.xml><?xml version="1.0" encoding="utf-8"?>
-<p:notes xmlns:a="http://schemas.openxmlformats.org/drawingml/2006/main" xmlns:r="http://schemas.openxmlformats.org/officeDocument/2006/relationships" xmlns:p="http://schemas.openxmlformats.org/presentationml/2006/main" showMasterSp="0" showMasterPhAnim="0">
-  <p:cSld>
-    <p:spTree>
-      <p:nvGrpSpPr>
-        <p:cNvPr id="1" name="Shape 91"/>
-        <p:cNvGrpSpPr/>
-        <p:nvPr/>
-      </p:nvGrpSpPr>
-      <p:grpSpPr>
-        <a:xfrm>
-          <a:off x="0" y="0"/>
-          <a:ext cx="0" cy="0"/>
-          <a:chOff x="0" y="0"/>
-          <a:chExt cx="0" cy="0"/>
-        </a:xfrm>
-      </p:grpSpPr>
-      <p:sp>
-        <p:nvSpPr>
-          <p:cNvPr id="92" name="Google Shape;92;g3fd3056a27_0_0:notes"/>
-          <p:cNvSpPr>
-            <a:spLocks noGrp="1" noRot="1" noChangeAspect="1"/>
-          </p:cNvSpPr>
-          <p:nvPr>
-            <p:ph type="sldImg" idx="2"/>
-          </p:nvPr>
-        </p:nvSpPr>
-        <p:spPr>
-          <a:xfrm>
-            <a:off x="381000" y="685800"/>
-            <a:ext cx="6096000" cy="3429000"/>
-          </a:xfrm>
-          <a:custGeom>
-            <a:avLst/>
-            <a:gdLst/>
-            <a:ahLst/>
-            <a:cxnLst/>
-            <a:rect l="l" t="t" r="r" b="b"/>
-            <a:pathLst>
-              <a:path w="120000" h="120000" extrusionOk="0">
-                <a:moveTo>
-                  <a:pt x="0" y="0"/>
-                </a:moveTo>
-                <a:lnTo>
-                  <a:pt x="120000" y="0"/>
-                </a:lnTo>
-                <a:lnTo>
-                  <a:pt x="120000" y="120000"/>
-                </a:lnTo>
-                <a:lnTo>
-                  <a:pt x="0" y="120000"/>
-                </a:lnTo>
-                <a:close/>
-              </a:path>
-            </a:pathLst>
-          </a:custGeom>
-        </p:spPr>
-      </p:sp>
-      <p:sp>
-        <p:nvSpPr>
-          <p:cNvPr id="93" name="Google Shape;93;g3fd3056a27_0_0:notes"/>
-          <p:cNvSpPr txBox="1">
-            <a:spLocks noGrp="1"/>
-          </p:cNvSpPr>
-          <p:nvPr>
-            <p:ph type="body" idx="1"/>
-          </p:nvPr>
-        </p:nvSpPr>
-        <p:spPr>
-          <a:xfrm>
-            <a:off x="685800" y="4343400"/>
-            <a:ext cx="5486400" cy="4114800"/>
-          </a:xfrm>
-          <a:prstGeom prst="rect">
-            <a:avLst/>
-          </a:prstGeom>
-        </p:spPr>
-        <p:txBody>
-          <a:bodyPr spcFirstLastPara="1" wrap="square" lIns="91425" tIns="91425" rIns="91425" bIns="91425" anchor="t" anchorCtr="0">
-            <a:noAutofit/>
-          </a:bodyPr>
-          <a:lstStyle/>
-          <a:p>
-            <a:pPr marL="0" lvl="0" indent="0" algn="l" rtl="0">
-              <a:spcBef>
-                <a:spcPts val="0"/>
-              </a:spcBef>
-              <a:spcAft>
-                <a:spcPts val="0"/>
-              </a:spcAft>
-              <a:buNone/>
-            </a:pPr>
-            <a:r>
-              <a:rPr lang="en"/>
-              <a:t>Resume Aug 21st</a:t>
-            </a:r>
-            <a:endParaRPr/>
-          </a:p>
-        </p:txBody>
-      </p:sp>
-    </p:spTree>
-    <p:extLst>
-      <p:ext uri="{BB962C8B-B14F-4D97-AF65-F5344CB8AC3E}">
-        <p14:creationId xmlns:p14="http://schemas.microsoft.com/office/powerpoint/2010/main" val="2721490249"/>
-      </p:ext>
-    </p:extLst>
-  </p:cSld>
-  <p:clrMapOvr>
-    <a:masterClrMapping/>
-  </p:clrMapOvr>
-</p:notes>
-</file>
-
-<file path=ppt/notesSlides/notesSlide16.xml><?xml version="1.0" encoding="utf-8"?>
 <p:notes xmlns:a="http://schemas.openxmlformats.org/drawingml/2006/main" xmlns:r="http://schemas.openxmlformats.org/officeDocument/2006/relationships" xmlns:p="http://schemas.openxmlformats.org/presentationml/2006/main" showMasterSp="0" showMasterPhAnim="0">
   <p:cSld>
     <p:spTree>
@@ -1915,7 +1801,7 @@
     </p:spTree>
     <p:extLst>
       <p:ext uri="{BB962C8B-B14F-4D97-AF65-F5344CB8AC3E}">
-        <p14:creationId xmlns:p14="http://schemas.microsoft.com/office/powerpoint/2010/main" val="18881348"/>
+        <p14:creationId xmlns:p14="http://schemas.microsoft.com/office/powerpoint/2010/main" val="590087873"/>
       </p:ext>
     </p:extLst>
   </p:cSld>
@@ -2028,7 +1914,7 @@
     </p:spTree>
     <p:extLst>
       <p:ext uri="{BB962C8B-B14F-4D97-AF65-F5344CB8AC3E}">
-        <p14:creationId xmlns:p14="http://schemas.microsoft.com/office/powerpoint/2010/main" val="590087873"/>
+        <p14:creationId xmlns:p14="http://schemas.microsoft.com/office/powerpoint/2010/main" val="1961916327"/>
       </p:ext>
     </p:extLst>
   </p:cSld>
@@ -2141,7 +2027,7 @@
     </p:spTree>
     <p:extLst>
       <p:ext uri="{BB962C8B-B14F-4D97-AF65-F5344CB8AC3E}">
-        <p14:creationId xmlns:p14="http://schemas.microsoft.com/office/powerpoint/2010/main" val="1961916327"/>
+        <p14:creationId xmlns:p14="http://schemas.microsoft.com/office/powerpoint/2010/main" val="2677802266"/>
       </p:ext>
     </p:extLst>
   </p:cSld>
@@ -2254,7 +2140,7 @@
     </p:spTree>
     <p:extLst>
       <p:ext uri="{BB962C8B-B14F-4D97-AF65-F5344CB8AC3E}">
-        <p14:creationId xmlns:p14="http://schemas.microsoft.com/office/powerpoint/2010/main" val="2677802266"/>
+        <p14:creationId xmlns:p14="http://schemas.microsoft.com/office/powerpoint/2010/main" val="2039510149"/>
       </p:ext>
     </p:extLst>
   </p:cSld>
@@ -2367,7 +2253,7 @@
     </p:spTree>
     <p:extLst>
       <p:ext uri="{BB962C8B-B14F-4D97-AF65-F5344CB8AC3E}">
-        <p14:creationId xmlns:p14="http://schemas.microsoft.com/office/powerpoint/2010/main" val="2039510149"/>
+        <p14:creationId xmlns:p14="http://schemas.microsoft.com/office/powerpoint/2010/main" val="3344032723"/>
       </p:ext>
     </p:extLst>
   </p:cSld>
@@ -2480,7 +2366,7 @@
     </p:spTree>
     <p:extLst>
       <p:ext uri="{BB962C8B-B14F-4D97-AF65-F5344CB8AC3E}">
-        <p14:creationId xmlns:p14="http://schemas.microsoft.com/office/powerpoint/2010/main" val="3344032723"/>
+        <p14:creationId xmlns:p14="http://schemas.microsoft.com/office/powerpoint/2010/main" val="3447910590"/>
       </p:ext>
     </p:extLst>
   </p:cSld>
@@ -8155,7 +8041,7 @@
             </a:pPr>
             <a:r>
               <a:rPr lang="en-US" dirty="0"/>
-              <a:t>REST</a:t>
+              <a:t>Public Clouds</a:t>
             </a:r>
             <a:endParaRPr dirty="0"/>
           </a:p>
@@ -8204,31 +8090,7 @@
             </a:pPr>
             <a:r>
               <a:rPr lang="en-US" dirty="0"/>
-              <a:t>REST – </a:t>
-            </a:r>
-            <a:r>
-              <a:rPr lang="en-US" b="1" dirty="0"/>
-              <a:t>Re</a:t>
-            </a:r>
-            <a:r>
-              <a:rPr lang="en-US" dirty="0"/>
-              <a:t>presentational </a:t>
-            </a:r>
-            <a:r>
-              <a:rPr lang="en-US" b="1" dirty="0"/>
-              <a:t>S</a:t>
-            </a:r>
-            <a:r>
-              <a:rPr lang="en-US" dirty="0"/>
-              <a:t>tate </a:t>
-            </a:r>
-            <a:r>
-              <a:rPr lang="en-US" b="1" dirty="0"/>
-              <a:t>T</a:t>
-            </a:r>
-            <a:r>
-              <a:rPr lang="en-US" dirty="0"/>
-              <a:t>ransfer</a:t>
+              <a:t>You’ve probably heard of them before, AWS, Azure, GCP, etc.</a:t>
             </a:r>
           </a:p>
           <a:p>
@@ -8244,7 +8106,7 @@
             </a:pPr>
             <a:r>
               <a:rPr lang="en-US" dirty="0"/>
-              <a:t>Some interviewers will ask you to define REST, a lot of people fail on this, they can provide examples, but fail to explain what it is.</a:t>
+              <a:t>These are the public clouds many companies are using to run their businesses!</a:t>
             </a:r>
           </a:p>
           <a:p>
@@ -8260,23 +8122,20 @@
             </a:pPr>
             <a:r>
               <a:rPr lang="en-US" dirty="0"/>
-              <a:t>REST in its simplest form is a design paradigm for web services built on top of HTTP.</a:t>
-            </a:r>
-          </a:p>
-          <a:p>
-            <a:pPr marL="457200" lvl="0" indent="-342900" algn="l" rtl="0">
-              <a:spcBef>
-                <a:spcPts val="0"/>
-              </a:spcBef>
-              <a:spcAft>
-                <a:spcPts val="0"/>
-              </a:spcAft>
+              <a:t>These public clouds provide many services at various layers including</a:t>
+            </a:r>
+          </a:p>
+          <a:p>
+            <a:pPr lvl="1" indent="-342900">
+              <a:spcBef>
+                <a:spcPts val="0"/>
+              </a:spcBef>
               <a:buSzPts val="1800"/>
               <a:buChar char="●"/>
             </a:pPr>
             <a:r>
               <a:rPr lang="en-US" dirty="0"/>
-              <a:t>HTTP Verbs</a:t>
+              <a:t>IAAS – Infrastructure as a service – Basic building blocks of IT – Servers, network, data storage, etc.</a:t>
             </a:r>
           </a:p>
           <a:p>
@@ -8289,7 +8148,15 @@
             </a:pPr>
             <a:r>
               <a:rPr lang="en-US" dirty="0"/>
-              <a:t>GET</a:t>
+              <a:t>PAAS – Platform as a service – Hardware and OS, allows for focus on deployment. No need to worry about OS level concerns (patches, </a:t>
+            </a:r>
+            <a:r>
+              <a:rPr lang="en-US" dirty="0" err="1"/>
+              <a:t>etc</a:t>
+            </a:r>
+            <a:r>
+              <a:rPr lang="en-US" dirty="0"/>
+              <a:t>)</a:t>
             </a:r>
           </a:p>
           <a:p>
@@ -8302,33 +8169,7 @@
             </a:pPr>
             <a:r>
               <a:rPr lang="en-US" dirty="0"/>
-              <a:t>POST</a:t>
-            </a:r>
-          </a:p>
-          <a:p>
-            <a:pPr lvl="1" indent="-342900">
-              <a:spcBef>
-                <a:spcPts val="0"/>
-              </a:spcBef>
-              <a:buSzPts val="1800"/>
-              <a:buChar char="●"/>
-            </a:pPr>
-            <a:r>
-              <a:rPr lang="en-US" dirty="0"/>
-              <a:t>PUT</a:t>
-            </a:r>
-          </a:p>
-          <a:p>
-            <a:pPr lvl="1" indent="-342900">
-              <a:spcBef>
-                <a:spcPts val="0"/>
-              </a:spcBef>
-              <a:buSzPts val="1800"/>
-              <a:buChar char="●"/>
-            </a:pPr>
-            <a:r>
-              <a:rPr lang="en-US" dirty="0"/>
-              <a:t>DELETE</a:t>
+              <a:t>SAAS – Software as a service – Completed product that can be run and is managed by the cloud provider. E.g. – Web-based email</a:t>
             </a:r>
           </a:p>
           <a:p>
@@ -8337,8 +8178,20 @@
             </a:pPr>
             <a:r>
               <a:rPr lang="en-US" dirty="0"/>
-              <a:t>RESTful services should be client-server based stateless web services usually using JSON as the data type. </a:t>
-            </a:r>
+              <a:t>The layer of public cloud services you use will depend on your needs, as you go from IAAS -&gt; SAAS, your low-level control disappears.</a:t>
+            </a:r>
+          </a:p>
+          <a:p>
+            <a:pPr indent="-342900">
+              <a:buSzPts val="1800"/>
+            </a:pPr>
+            <a:r>
+              <a:rPr lang="en-US" dirty="0">
+                <a:hlinkClick r:id="rId3"/>
+              </a:rPr>
+              <a:t>https://aws.amazon.com/types-of-cloud-computing/</a:t>
+            </a:r>
+            <a:endParaRPr lang="en-US" dirty="0"/>
           </a:p>
           <a:p>
             <a:pPr indent="-342900">
@@ -8364,7 +8217,7 @@
     </p:spTree>
     <p:extLst>
       <p:ext uri="{BB962C8B-B14F-4D97-AF65-F5344CB8AC3E}">
-        <p14:creationId xmlns:p14="http://schemas.microsoft.com/office/powerpoint/2010/main" val="629303076"/>
+        <p14:creationId xmlns:p14="http://schemas.microsoft.com/office/powerpoint/2010/main" val="1630937321"/>
       </p:ext>
     </p:extLst>
   </p:cSld>
@@ -8427,7 +8280,7 @@
             </a:pPr>
             <a:r>
               <a:rPr lang="en-US" dirty="0"/>
-              <a:t>Public Clouds</a:t>
+              <a:t>Containerization</a:t>
             </a:r>
             <a:endParaRPr dirty="0"/>
           </a:p>
@@ -8464,245 +8317,6 @@
           </a:bodyPr>
           <a:lstStyle/>
           <a:p>
-            <a:pPr marL="457200" lvl="0" indent="-342900" algn="l" rtl="0">
-              <a:spcBef>
-                <a:spcPts val="0"/>
-              </a:spcBef>
-              <a:spcAft>
-                <a:spcPts val="0"/>
-              </a:spcAft>
-              <a:buSzPts val="1800"/>
-              <a:buChar char="●"/>
-            </a:pPr>
-            <a:r>
-              <a:rPr lang="en-US" dirty="0"/>
-              <a:t>You’ve probably heard of them before, AWS, Azure, GCP, etc.</a:t>
-            </a:r>
-          </a:p>
-          <a:p>
-            <a:pPr marL="457200" lvl="0" indent="-342900" algn="l" rtl="0">
-              <a:spcBef>
-                <a:spcPts val="0"/>
-              </a:spcBef>
-              <a:spcAft>
-                <a:spcPts val="0"/>
-              </a:spcAft>
-              <a:buSzPts val="1800"/>
-              <a:buChar char="●"/>
-            </a:pPr>
-            <a:r>
-              <a:rPr lang="en-US" dirty="0"/>
-              <a:t>These are the public clouds many companies are using to run their businesses!</a:t>
-            </a:r>
-          </a:p>
-          <a:p>
-            <a:pPr marL="457200" lvl="0" indent="-342900" algn="l" rtl="0">
-              <a:spcBef>
-                <a:spcPts val="0"/>
-              </a:spcBef>
-              <a:spcAft>
-                <a:spcPts val="0"/>
-              </a:spcAft>
-              <a:buSzPts val="1800"/>
-              <a:buChar char="●"/>
-            </a:pPr>
-            <a:r>
-              <a:rPr lang="en-US" dirty="0"/>
-              <a:t>These public clouds provide many services at various layers including</a:t>
-            </a:r>
-          </a:p>
-          <a:p>
-            <a:pPr lvl="1" indent="-342900">
-              <a:spcBef>
-                <a:spcPts val="0"/>
-              </a:spcBef>
-              <a:buSzPts val="1800"/>
-              <a:buChar char="●"/>
-            </a:pPr>
-            <a:r>
-              <a:rPr lang="en-US" dirty="0"/>
-              <a:t>IAAS – Infrastructure as a service – Basic building blocks of IT – Servers, network, data storage, etc.</a:t>
-            </a:r>
-          </a:p>
-          <a:p>
-            <a:pPr lvl="1" indent="-342900">
-              <a:spcBef>
-                <a:spcPts val="0"/>
-              </a:spcBef>
-              <a:buSzPts val="1800"/>
-              <a:buChar char="●"/>
-            </a:pPr>
-            <a:r>
-              <a:rPr lang="en-US" dirty="0"/>
-              <a:t>PAAS – Platform as a service – Hardware and OS, allows for focus on deployment. No need to worry about OS level concerns (patches, </a:t>
-            </a:r>
-            <a:r>
-              <a:rPr lang="en-US" dirty="0" err="1"/>
-              <a:t>etc</a:t>
-            </a:r>
-            <a:r>
-              <a:rPr lang="en-US" dirty="0"/>
-              <a:t>)</a:t>
-            </a:r>
-          </a:p>
-          <a:p>
-            <a:pPr lvl="1" indent="-342900">
-              <a:spcBef>
-                <a:spcPts val="0"/>
-              </a:spcBef>
-              <a:buSzPts val="1800"/>
-              <a:buChar char="●"/>
-            </a:pPr>
-            <a:r>
-              <a:rPr lang="en-US" dirty="0"/>
-              <a:t>SAAS – Software as a service – Completed product that can be run and is managed by the cloud provider. E.g. – Web-based email</a:t>
-            </a:r>
-          </a:p>
-          <a:p>
-            <a:pPr indent="-342900">
-              <a:buSzPts val="1800"/>
-            </a:pPr>
-            <a:r>
-              <a:rPr lang="en-US" dirty="0"/>
-              <a:t>The layer of public cloud services you use will depend on your needs, as you go from IAAS -&gt; SAAS, your low-level control disappears.</a:t>
-            </a:r>
-          </a:p>
-          <a:p>
-            <a:pPr indent="-342900">
-              <a:buSzPts val="1800"/>
-            </a:pPr>
-            <a:r>
-              <a:rPr lang="en-US" dirty="0">
-                <a:hlinkClick r:id="rId3"/>
-              </a:rPr>
-              <a:t>https://aws.amazon.com/types-of-cloud-computing/</a:t>
-            </a:r>
-            <a:endParaRPr lang="en-US" dirty="0"/>
-          </a:p>
-          <a:p>
-            <a:pPr indent="-342900">
-              <a:buSzPts val="1800"/>
-            </a:pPr>
-            <a:endParaRPr lang="en-US" dirty="0"/>
-          </a:p>
-          <a:p>
-            <a:pPr marL="457200" lvl="0" indent="-342900" algn="l" rtl="0">
-              <a:spcBef>
-                <a:spcPts val="0"/>
-              </a:spcBef>
-              <a:spcAft>
-                <a:spcPts val="0"/>
-              </a:spcAft>
-              <a:buSzPts val="1800"/>
-              <a:buChar char="●"/>
-            </a:pPr>
-            <a:endParaRPr dirty="0"/>
-          </a:p>
-        </p:txBody>
-      </p:sp>
-    </p:spTree>
-    <p:extLst>
-      <p:ext uri="{BB962C8B-B14F-4D97-AF65-F5344CB8AC3E}">
-        <p14:creationId xmlns:p14="http://schemas.microsoft.com/office/powerpoint/2010/main" val="1630937321"/>
-      </p:ext>
-    </p:extLst>
-  </p:cSld>
-  <p:clrMapOvr>
-    <a:masterClrMapping/>
-  </p:clrMapOvr>
-</p:sld>
-</file>
-
-<file path=ppt/slides/slide12.xml><?xml version="1.0" encoding="utf-8"?>
-<p:sld xmlns:a="http://schemas.openxmlformats.org/drawingml/2006/main" xmlns:r="http://schemas.openxmlformats.org/officeDocument/2006/relationships" xmlns:p="http://schemas.openxmlformats.org/presentationml/2006/main">
-  <p:cSld>
-    <p:spTree>
-      <p:nvGrpSpPr>
-        <p:cNvPr id="1" name="Shape 94"/>
-        <p:cNvGrpSpPr/>
-        <p:nvPr/>
-      </p:nvGrpSpPr>
-      <p:grpSpPr>
-        <a:xfrm>
-          <a:off x="0" y="0"/>
-          <a:ext cx="0" cy="0"/>
-          <a:chOff x="0" y="0"/>
-          <a:chExt cx="0" cy="0"/>
-        </a:xfrm>
-      </p:grpSpPr>
-      <p:sp>
-        <p:nvSpPr>
-          <p:cNvPr id="95" name="Google Shape;95;p17"/>
-          <p:cNvSpPr txBox="1">
-            <a:spLocks noGrp="1"/>
-          </p:cNvSpPr>
-          <p:nvPr>
-            <p:ph type="title"/>
-          </p:nvPr>
-        </p:nvSpPr>
-        <p:spPr>
-          <a:xfrm>
-            <a:off x="471900" y="738725"/>
-            <a:ext cx="8222100" cy="767700"/>
-          </a:xfrm>
-          <a:prstGeom prst="rect">
-            <a:avLst/>
-          </a:prstGeom>
-        </p:spPr>
-        <p:txBody>
-          <a:bodyPr spcFirstLastPara="1" wrap="square" lIns="91425" tIns="91425" rIns="91425" bIns="91425" anchor="b" anchorCtr="0">
-            <a:noAutofit/>
-          </a:bodyPr>
-          <a:lstStyle/>
-          <a:p>
-            <a:pPr marL="0" lvl="0" indent="0" algn="l" rtl="0">
-              <a:spcBef>
-                <a:spcPts val="0"/>
-              </a:spcBef>
-              <a:spcAft>
-                <a:spcPts val="0"/>
-              </a:spcAft>
-              <a:buNone/>
-            </a:pPr>
-            <a:r>
-              <a:rPr lang="en-US" dirty="0"/>
-              <a:t>Containerization</a:t>
-            </a:r>
-            <a:endParaRPr dirty="0"/>
-          </a:p>
-        </p:txBody>
-      </p:sp>
-      <p:sp>
-        <p:nvSpPr>
-          <p:cNvPr id="31" name="Google Shape;89;p16">
-            <a:extLst>
-              <a:ext uri="{FF2B5EF4-FFF2-40B4-BE49-F238E27FC236}">
-                <a16:creationId xmlns:a16="http://schemas.microsoft.com/office/drawing/2014/main" id="{67E34750-AD08-E94A-B9F8-33F50EC2B699}"/>
-              </a:ext>
-            </a:extLst>
-          </p:cNvPr>
-          <p:cNvSpPr txBox="1">
-            <a:spLocks noGrp="1"/>
-          </p:cNvSpPr>
-          <p:nvPr>
-            <p:ph type="body" idx="1"/>
-          </p:nvPr>
-        </p:nvSpPr>
-        <p:spPr>
-          <a:xfrm>
-            <a:off x="471900" y="1919075"/>
-            <a:ext cx="8222100" cy="2710200"/>
-          </a:xfrm>
-          <a:prstGeom prst="rect">
-            <a:avLst/>
-          </a:prstGeom>
-        </p:spPr>
-        <p:txBody>
-          <a:bodyPr spcFirstLastPara="1" wrap="square" lIns="91425" tIns="91425" rIns="91425" bIns="91425" anchor="t" anchorCtr="0">
-            <a:noAutofit/>
-          </a:bodyPr>
-          <a:lstStyle/>
-          <a:p>
             <a:pPr indent="-342900">
               <a:buSzPts val="1800"/>
             </a:pPr>
@@ -8803,7 +8417,7 @@
 </p:sld>
 </file>
 
-<file path=ppt/slides/slide13.xml><?xml version="1.0" encoding="utf-8"?>
+<file path=ppt/slides/slide12.xml><?xml version="1.0" encoding="utf-8"?>
 <p:sld xmlns:a="http://schemas.openxmlformats.org/drawingml/2006/main" xmlns:r="http://schemas.openxmlformats.org/officeDocument/2006/relationships" xmlns:p="http://schemas.openxmlformats.org/presentationml/2006/main">
   <p:cSld>
     <p:spTree>
@@ -9231,7 +8845,7 @@
 </p:sld>
 </file>
 
-<file path=ppt/slides/slide14.xml><?xml version="1.0" encoding="utf-8"?>
+<file path=ppt/slides/slide13.xml><?xml version="1.0" encoding="utf-8"?>
 <p:sld xmlns:a="http://schemas.openxmlformats.org/drawingml/2006/main" xmlns:r="http://schemas.openxmlformats.org/officeDocument/2006/relationships" xmlns:p="http://schemas.openxmlformats.org/presentationml/2006/main">
   <p:cSld>
     <p:spTree>
@@ -9423,7 +9037,7 @@
 </p:sld>
 </file>
 
-<file path=ppt/slides/slide15.xml><?xml version="1.0" encoding="utf-8"?>
+<file path=ppt/slides/slide14.xml><?xml version="1.0" encoding="utf-8"?>
 <p:sld xmlns:a="http://schemas.openxmlformats.org/drawingml/2006/main" xmlns:r="http://schemas.openxmlformats.org/officeDocument/2006/relationships" xmlns:p="http://schemas.openxmlformats.org/presentationml/2006/main">
   <p:cSld>
     <p:spTree>
@@ -9630,7 +9244,7 @@
 </p:sld>
 </file>
 
-<file path=ppt/slides/slide16.xml><?xml version="1.0" encoding="utf-8"?>
+<file path=ppt/slides/slide15.xml><?xml version="1.0" encoding="utf-8"?>
 <p:sld xmlns:a="http://schemas.openxmlformats.org/drawingml/2006/main" xmlns:r="http://schemas.openxmlformats.org/officeDocument/2006/relationships" xmlns:p="http://schemas.openxmlformats.org/presentationml/2006/main">
   <p:cSld>
     <p:spTree>
@@ -9915,12 +9529,8 @@
               <a:buChar char="●"/>
             </a:pPr>
             <a:r>
-              <a:rPr lang="en-US" dirty="0" err="1"/>
-              <a:t>DataCamp</a:t>
-            </a:r>
-            <a:r>
               <a:rPr lang="en-US" dirty="0"/>
-              <a:t> Introduction</a:t>
+              <a:t>Liftoff Completion Requirements</a:t>
             </a:r>
           </a:p>
           <a:p>
@@ -9943,30 +9553,7 @@
             </a:pPr>
             <a:r>
               <a:rPr lang="en-US" dirty="0"/>
-              <a:t>Liftoff Completion Requirements</a:t>
-            </a:r>
-          </a:p>
-          <a:p>
-            <a:pPr lvl="1" indent="-342900">
-              <a:spcBef>
-                <a:spcPts val="0"/>
-              </a:spcBef>
-              <a:buSzPts val="1800"/>
-              <a:buChar char="●"/>
-            </a:pPr>
-            <a:endParaRPr lang="en-US" dirty="0"/>
-          </a:p>
-          <a:p>
-            <a:pPr lvl="1" indent="-342900">
-              <a:spcBef>
-                <a:spcPts val="0"/>
-              </a:spcBef>
-              <a:buSzPts val="1800"/>
-              <a:buChar char="●"/>
-            </a:pPr>
-            <a:r>
-              <a:rPr lang="en-US" dirty="0"/>
-              <a:t>Liftoff additional fun topics </a:t>
+              <a:t>Additional fun topics </a:t>
             </a:r>
             <a:r>
               <a:rPr lang="en-US" dirty="0">
@@ -11694,12 +11281,8 @@
               <a:buNone/>
             </a:pPr>
             <a:r>
-              <a:rPr lang="en-US" dirty="0" err="1"/>
-              <a:t>DataCamp</a:t>
-            </a:r>
-            <a:r>
               <a:rPr lang="en-US" dirty="0"/>
-              <a:t> Introduction </a:t>
+              <a:t>What does it take to finish Lift Off?</a:t>
             </a:r>
             <a:endParaRPr dirty="0"/>
           </a:p>
@@ -11759,6 +11342,110 @@
               <a:buSzPts val="1800"/>
               <a:buChar char="●"/>
             </a:pPr>
+            <a:r>
+              <a:rPr lang="en-US" dirty="0"/>
+              <a:t>Mock Interview Module</a:t>
+            </a:r>
+          </a:p>
+          <a:p>
+            <a:pPr marL="457200" lvl="0" indent="-342900" algn="l" rtl="0">
+              <a:spcBef>
+                <a:spcPts val="0"/>
+              </a:spcBef>
+              <a:spcAft>
+                <a:spcPts val="0"/>
+              </a:spcAft>
+              <a:buSzPts val="1800"/>
+              <a:buChar char="●"/>
+            </a:pPr>
+            <a:r>
+              <a:rPr lang="en-US" dirty="0"/>
+              <a:t>Live Coding Module</a:t>
+            </a:r>
+          </a:p>
+          <a:p>
+            <a:pPr marL="457200" lvl="0" indent="-342900" algn="l" rtl="0">
+              <a:spcBef>
+                <a:spcPts val="0"/>
+              </a:spcBef>
+              <a:spcAft>
+                <a:spcPts val="0"/>
+              </a:spcAft>
+              <a:buSzPts val="1800"/>
+              <a:buChar char="●"/>
+            </a:pPr>
+            <a:r>
+              <a:rPr lang="en-US" dirty="0" err="1"/>
+              <a:t>LaunchCode</a:t>
+            </a:r>
+            <a:r>
+              <a:rPr lang="en-US" dirty="0"/>
+              <a:t> Resume (Submitted via Canvas)</a:t>
+            </a:r>
+          </a:p>
+          <a:p>
+            <a:pPr marL="457200" lvl="0" indent="-342900" algn="l" rtl="0">
+              <a:spcBef>
+                <a:spcPts val="0"/>
+              </a:spcBef>
+              <a:spcAft>
+                <a:spcPts val="0"/>
+              </a:spcAft>
+              <a:buSzPts val="1800"/>
+              <a:buChar char="●"/>
+            </a:pPr>
+            <a:r>
+              <a:rPr lang="en-US" dirty="0"/>
+              <a:t>Final Project Review</a:t>
+            </a:r>
+          </a:p>
+          <a:p>
+            <a:pPr marL="457200" lvl="0" indent="-342900" algn="l" rtl="0">
+              <a:spcBef>
+                <a:spcPts val="0"/>
+              </a:spcBef>
+              <a:spcAft>
+                <a:spcPts val="0"/>
+              </a:spcAft>
+              <a:buSzPts val="1800"/>
+              <a:buChar char="●"/>
+            </a:pPr>
+            <a:r>
+              <a:rPr lang="en-US" dirty="0" err="1"/>
+              <a:t>LiftOff</a:t>
+            </a:r>
+            <a:r>
+              <a:rPr lang="en-US" dirty="0"/>
+              <a:t> “Ready For Placement” Survey</a:t>
+            </a:r>
+          </a:p>
+          <a:p>
+            <a:pPr marL="457200" lvl="0" indent="-342900" algn="l" rtl="0">
+              <a:spcBef>
+                <a:spcPts val="0"/>
+              </a:spcBef>
+              <a:spcAft>
+                <a:spcPts val="0"/>
+              </a:spcAft>
+              <a:buSzPts val="1800"/>
+              <a:buChar char="●"/>
+            </a:pPr>
+            <a:r>
+              <a:rPr lang="en-US" dirty="0"/>
+              <a:t>Demographic Form (if not completed)</a:t>
+            </a:r>
+          </a:p>
+          <a:p>
+            <a:pPr marL="457200" lvl="0" indent="-342900" algn="l" rtl="0">
+              <a:spcBef>
+                <a:spcPts val="0"/>
+              </a:spcBef>
+              <a:spcAft>
+                <a:spcPts val="0"/>
+              </a:spcAft>
+              <a:buSzPts val="1800"/>
+              <a:buChar char="●"/>
+            </a:pPr>
             <a:endParaRPr dirty="0"/>
           </a:p>
         </p:txBody>
@@ -11766,7 +11453,7 @@
     </p:spTree>
     <p:extLst>
       <p:ext uri="{BB962C8B-B14F-4D97-AF65-F5344CB8AC3E}">
-        <p14:creationId xmlns:p14="http://schemas.microsoft.com/office/powerpoint/2010/main" val="3931427364"/>
+        <p14:creationId xmlns:p14="http://schemas.microsoft.com/office/powerpoint/2010/main" val="866737326"/>
       </p:ext>
     </p:extLst>
   </p:cSld>
@@ -11828,16 +11515,12 @@
               <a:buNone/>
             </a:pPr>
             <a:r>
-              <a:rPr lang="en-US" dirty="0"/>
-              <a:t>What does it take to finish </a:t>
-            </a:r>
-            <a:r>
               <a:rPr lang="en-US" dirty="0" err="1"/>
               <a:t>LiftOff</a:t>
             </a:r>
             <a:r>
               <a:rPr lang="en-US" dirty="0"/>
-              <a:t>?</a:t>
+              <a:t> Fun Topics!</a:t>
             </a:r>
             <a:endParaRPr dirty="0"/>
           </a:p>
@@ -11899,7 +11582,21 @@
             </a:pPr>
             <a:r>
               <a:rPr lang="en-US" dirty="0"/>
-              <a:t>Mock Interview Module</a:t>
+              <a:t>We decided to add a few fun topics of discussion tonight outside of the normal </a:t>
+            </a:r>
+            <a:r>
+              <a:rPr lang="en-US" dirty="0" err="1"/>
+              <a:t>LiftOff</a:t>
+            </a:r>
+            <a:r>
+              <a:rPr lang="en-US" dirty="0"/>
+              <a:t> curriculum </a:t>
+            </a:r>
+            <a:r>
+              <a:rPr lang="en-US" dirty="0">
+                <a:sym typeface="Wingdings" pitchFamily="2" charset="2"/>
+              </a:rPr>
+              <a:t></a:t>
             </a:r>
           </a:p>
           <a:p>
@@ -11913,82 +11610,35 @@
               <a:buSzPts val="1800"/>
               <a:buChar char="●"/>
             </a:pPr>
+            <a:endParaRPr lang="en-US" dirty="0">
+              <a:sym typeface="Wingdings" pitchFamily="2" charset="2"/>
+            </a:endParaRPr>
+          </a:p>
+          <a:p>
+            <a:pPr lvl="0" indent="-342900">
+              <a:buSzPts val="1800"/>
+            </a:pPr>
+            <a:r>
+              <a:rPr lang="en-US" dirty="0">
+                <a:sym typeface="Wingdings" pitchFamily="2" charset="2"/>
+              </a:rPr>
+              <a:t>Note: </a:t>
+            </a:r>
             <a:r>
               <a:rPr lang="en-US" dirty="0"/>
-              <a:t>Live Coding Module</a:t>
-            </a:r>
-          </a:p>
-          <a:p>
-            <a:pPr marL="457200" lvl="0" indent="-342900" algn="l" rtl="0">
-              <a:spcBef>
-                <a:spcPts val="0"/>
-              </a:spcBef>
-              <a:spcAft>
-                <a:spcPts val="0"/>
-              </a:spcAft>
-              <a:buSzPts val="1800"/>
-              <a:buChar char="●"/>
-            </a:pPr>
-            <a:r>
-              <a:rPr lang="en-US" dirty="0" err="1"/>
-              <a:t>LaunchCode</a:t>
+              <a:t>All these things are items that from one lecture you will not be proficient in. This is mainly to introduce you to other technologies </a:t>
+            </a:r>
+            <a:r>
+              <a:rPr lang="en-US" b="1" dirty="0"/>
+              <a:t>for you to explore after graduating </a:t>
             </a:r>
             <a:r>
               <a:rPr lang="en-US" dirty="0"/>
-              <a:t> Resume (Submitted via Canvas)</a:t>
-            </a:r>
-          </a:p>
-          <a:p>
-            <a:pPr marL="457200" lvl="0" indent="-342900" algn="l" rtl="0">
-              <a:spcBef>
-                <a:spcPts val="0"/>
-              </a:spcBef>
-              <a:spcAft>
-                <a:spcPts val="0"/>
-              </a:spcAft>
-              <a:buSzPts val="1800"/>
-              <a:buChar char="●"/>
-            </a:pPr>
-            <a:r>
-              <a:rPr lang="en-US" dirty="0"/>
-              <a:t>Final Project Review</a:t>
-            </a:r>
-          </a:p>
-          <a:p>
-            <a:pPr marL="457200" lvl="0" indent="-342900" algn="l" rtl="0">
-              <a:spcBef>
-                <a:spcPts val="0"/>
-              </a:spcBef>
-              <a:spcAft>
-                <a:spcPts val="0"/>
-              </a:spcAft>
-              <a:buSzPts val="1800"/>
-              <a:buChar char="●"/>
-            </a:pPr>
-            <a:r>
-              <a:rPr lang="en-US" dirty="0" err="1"/>
-              <a:t>LiftOff</a:t>
-            </a:r>
-            <a:r>
-              <a:rPr lang="en-US" dirty="0"/>
-              <a:t> “Ready For Placement” Survey</a:t>
-            </a:r>
-          </a:p>
-          <a:p>
-            <a:pPr marL="457200" lvl="0" indent="-342900" algn="l" rtl="0">
-              <a:spcBef>
-                <a:spcPts val="0"/>
-              </a:spcBef>
-              <a:spcAft>
-                <a:spcPts val="0"/>
-              </a:spcAft>
-              <a:buSzPts val="1800"/>
-              <a:buChar char="●"/>
-            </a:pPr>
-            <a:r>
-              <a:rPr lang="en-US" dirty="0"/>
-              <a:t>Demographic Form (if not completed)</a:t>
-            </a:r>
+              <a:t>and could be something else you are interested in!</a:t>
+            </a:r>
+            <a:endParaRPr lang="en-US" dirty="0">
+              <a:sym typeface="Wingdings" pitchFamily="2" charset="2"/>
+            </a:endParaRPr>
           </a:p>
           <a:p>
             <a:pPr marL="457200" lvl="0" indent="-342900" algn="l" rtl="0">
@@ -12008,7 +11658,7 @@
     </p:spTree>
     <p:extLst>
       <p:ext uri="{BB962C8B-B14F-4D97-AF65-F5344CB8AC3E}">
-        <p14:creationId xmlns:p14="http://schemas.microsoft.com/office/powerpoint/2010/main" val="866737326"/>
+        <p14:creationId xmlns:p14="http://schemas.microsoft.com/office/powerpoint/2010/main" val="2552909750"/>
       </p:ext>
     </p:extLst>
   </p:cSld>
@@ -12070,12 +11720,8 @@
               <a:buNone/>
             </a:pPr>
             <a:r>
-              <a:rPr lang="en-US" dirty="0" err="1"/>
-              <a:t>LiftOff</a:t>
-            </a:r>
-            <a:r>
               <a:rPr lang="en-US" dirty="0"/>
-              <a:t> Fun Topics!</a:t>
+              <a:t>DevOps</a:t>
             </a:r>
             <a:endParaRPr dirty="0"/>
           </a:p>
@@ -12099,8 +11745,8 @@
         </p:nvSpPr>
         <p:spPr>
           <a:xfrm>
-            <a:off x="471900" y="1919075"/>
-            <a:ext cx="8222100" cy="2710200"/>
+            <a:off x="460950" y="1718184"/>
+            <a:ext cx="8222100" cy="3172470"/>
           </a:xfrm>
           <a:prstGeom prst="rect">
             <a:avLst/>
@@ -12137,21 +11783,7 @@
             </a:pPr>
             <a:r>
               <a:rPr lang="en-US" dirty="0"/>
-              <a:t>We decided to add a few fun topics of discussion tonight outside of the normal </a:t>
-            </a:r>
-            <a:r>
-              <a:rPr lang="en-US" dirty="0" err="1"/>
-              <a:t>LiftOff</a:t>
-            </a:r>
-            <a:r>
-              <a:rPr lang="en-US" dirty="0"/>
-              <a:t> curriculum </a:t>
-            </a:r>
-            <a:r>
-              <a:rPr lang="en-US" dirty="0">
-                <a:sym typeface="Wingdings" pitchFamily="2" charset="2"/>
-              </a:rPr>
-              <a:t></a:t>
+              <a:t>DevOps -&gt; Development Operations; philosophies, practices, and tools that help to deliver software/services to users more efficiently.</a:t>
             </a:r>
           </a:p>
           <a:p>
@@ -12165,55 +11797,141 @@
               <a:buSzPts val="1800"/>
               <a:buChar char="●"/>
             </a:pPr>
-            <a:endParaRPr lang="en-US" dirty="0">
-              <a:sym typeface="Wingdings" pitchFamily="2" charset="2"/>
-            </a:endParaRPr>
+            <a:r>
+              <a:rPr lang="en-US" dirty="0"/>
+              <a:t>Continuous Integration</a:t>
+            </a:r>
+          </a:p>
+          <a:p>
+            <a:pPr lvl="1" indent="-342900">
+              <a:spcBef>
+                <a:spcPts val="0"/>
+              </a:spcBef>
+              <a:buSzPts val="1800"/>
+              <a:buChar char="●"/>
+            </a:pPr>
+            <a:r>
+              <a:rPr lang="en-US" dirty="0"/>
+              <a:t>Things such as Jenkins to build code developed by multiple concurrent engineers </a:t>
+            </a:r>
           </a:p>
           <a:p>
             <a:pPr lvl="0" indent="-342900">
               <a:buSzPts val="1800"/>
             </a:pPr>
             <a:r>
-              <a:rPr lang="en-US" dirty="0">
-                <a:sym typeface="Wingdings" pitchFamily="2" charset="2"/>
-              </a:rPr>
-              <a:t>Note: </a:t>
-            </a:r>
-            <a:r>
               <a:rPr lang="en-US" dirty="0"/>
-              <a:t>All of these things are items that from one lecture you will not be proficient in. This is mainly to introduce you to other technologies </a:t>
-            </a:r>
-            <a:r>
-              <a:rPr lang="en-US" b="1" dirty="0"/>
-              <a:t>for you to explore after graduating </a:t>
-            </a:r>
-            <a:r>
-              <a:rPr lang="en-US" dirty="0"/>
-              <a:t>and could be something else you are interested in!</a:t>
-            </a:r>
-            <a:endParaRPr lang="en-US" dirty="0">
-              <a:sym typeface="Wingdings" pitchFamily="2" charset="2"/>
-            </a:endParaRPr>
-          </a:p>
-          <a:p>
-            <a:pPr marL="457200" lvl="0" indent="-342900" algn="l" rtl="0">
-              <a:spcBef>
-                <a:spcPts val="0"/>
-              </a:spcBef>
-              <a:spcAft>
-                <a:spcPts val="0"/>
-              </a:spcAft>
+              <a:t>Continuous Delivery</a:t>
+            </a:r>
+          </a:p>
+          <a:p>
+            <a:pPr lvl="1" indent="-342900">
+              <a:spcBef>
+                <a:spcPts val="0"/>
+              </a:spcBef>
               <a:buSzPts val="1800"/>
               <a:buChar char="●"/>
             </a:pPr>
-            <a:endParaRPr dirty="0"/>
+            <a:r>
+              <a:rPr lang="en-US" dirty="0"/>
+              <a:t>Automated code building, testing and preparing for release to production. Takes code from build -&gt; deploy</a:t>
+            </a:r>
+          </a:p>
+          <a:p>
+            <a:pPr lvl="0" indent="-342900">
+              <a:buSzPts val="1800"/>
+            </a:pPr>
+            <a:r>
+              <a:rPr lang="en-US" dirty="0"/>
+              <a:t>Build Pipelines</a:t>
+            </a:r>
+          </a:p>
+          <a:p>
+            <a:pPr lvl="1" indent="-342900">
+              <a:spcBef>
+                <a:spcPts val="0"/>
+              </a:spcBef>
+              <a:buSzPts val="1800"/>
+              <a:buChar char="●"/>
+            </a:pPr>
+            <a:r>
+              <a:rPr lang="en-US" dirty="0"/>
+              <a:t>Automated code jobs/stages, a typical pipeline would </a:t>
+            </a:r>
+            <a:r>
+              <a:rPr lang="en-US" b="1" dirty="0"/>
+              <a:t>build</a:t>
+            </a:r>
+            <a:r>
+              <a:rPr lang="en-US" dirty="0"/>
+              <a:t>, </a:t>
+            </a:r>
+            <a:r>
+              <a:rPr lang="en-US" b="1" dirty="0"/>
+              <a:t>test</a:t>
+            </a:r>
+            <a:r>
+              <a:rPr lang="en-US" dirty="0"/>
+              <a:t>, </a:t>
+            </a:r>
+            <a:r>
+              <a:rPr lang="en-US" b="1" dirty="0"/>
+              <a:t>deploy to staging</a:t>
+            </a:r>
+            <a:r>
+              <a:rPr lang="en-US" dirty="0"/>
+              <a:t>, then </a:t>
+            </a:r>
+            <a:r>
+              <a:rPr lang="en-US" b="1" dirty="0"/>
+              <a:t>deploy to production</a:t>
+            </a:r>
+            <a:r>
+              <a:rPr lang="en-US" dirty="0"/>
+              <a:t>. There are many types of pipelines, see: </a:t>
+            </a:r>
+            <a:r>
+              <a:rPr lang="en-US" dirty="0">
+                <a:hlinkClick r:id="rId3"/>
+              </a:rPr>
+              <a:t>https://docs.gitlab.com/ee/ci/pipelines/</a:t>
+            </a:r>
+            <a:endParaRPr lang="en-US" dirty="0"/>
+          </a:p>
+          <a:p>
+            <a:pPr lvl="0" indent="-342900">
+              <a:buSzPts val="1800"/>
+            </a:pPr>
+            <a:r>
+              <a:rPr lang="en-US" dirty="0"/>
+              <a:t>Monitoring and Logging</a:t>
+            </a:r>
+          </a:p>
+          <a:p>
+            <a:pPr lvl="1" indent="-342900">
+              <a:spcBef>
+                <a:spcPts val="0"/>
+              </a:spcBef>
+              <a:buSzPts val="1800"/>
+              <a:buChar char="●"/>
+            </a:pPr>
+            <a:r>
+              <a:rPr lang="en-US" dirty="0"/>
+              <a:t>Things critical for high availability and troubleshooting; examples: Splunk, New Relic, etc.</a:t>
+            </a:r>
+          </a:p>
+          <a:p>
+            <a:pPr indent="-342900">
+              <a:buSzPts val="1800"/>
+            </a:pPr>
+            <a:endParaRPr lang="en-US" dirty="0"/>
           </a:p>
         </p:txBody>
       </p:sp>
     </p:spTree>
     <p:extLst>
       <p:ext uri="{BB962C8B-B14F-4D97-AF65-F5344CB8AC3E}">
-        <p14:creationId xmlns:p14="http://schemas.microsoft.com/office/powerpoint/2010/main" val="2552909750"/>
+        <p14:creationId xmlns:p14="http://schemas.microsoft.com/office/powerpoint/2010/main" val="2216305668"/>
       </p:ext>
     </p:extLst>
   </p:cSld>
@@ -12276,7 +11994,7 @@
             </a:pPr>
             <a:r>
               <a:rPr lang="en-US" dirty="0"/>
-              <a:t>DevOps</a:t>
+              <a:t>Deployments (rolling and blue/green)</a:t>
             </a:r>
             <a:endParaRPr dirty="0"/>
           </a:p>
@@ -12301,7 +12019,7 @@
         <p:spPr>
           <a:xfrm>
             <a:off x="460950" y="1718184"/>
-            <a:ext cx="8222100" cy="3172470"/>
+            <a:ext cx="8222100" cy="3345652"/>
           </a:xfrm>
           <a:prstGeom prst="rect">
             <a:avLst/>
@@ -12323,7 +12041,10 @@
               <a:buSzPts val="1800"/>
               <a:buChar char="●"/>
             </a:pPr>
-            <a:endParaRPr lang="en-US" dirty="0"/>
+            <a:r>
+              <a:rPr lang="en-US" dirty="0"/>
+              <a:t>We spent all of LC101 and Liftoff (thus far) teaching you how to code, but not how to deploy</a:t>
+            </a:r>
           </a:p>
           <a:p>
             <a:pPr marL="457200" lvl="0" indent="-342900" algn="l" rtl="0">
@@ -12338,36 +12059,7 @@
             </a:pPr>
             <a:r>
               <a:rPr lang="en-US" dirty="0"/>
-              <a:t>DevOps -&gt; Development Operations; philosophies, practices, and tools that help to deliver software/services to users more efficiently.</a:t>
-            </a:r>
-          </a:p>
-          <a:p>
-            <a:pPr marL="457200" lvl="0" indent="-342900" algn="l" rtl="0">
-              <a:spcBef>
-                <a:spcPts val="0"/>
-              </a:spcBef>
-              <a:spcAft>
-                <a:spcPts val="0"/>
-              </a:spcAft>
-              <a:buSzPts val="1800"/>
-              <a:buChar char="●"/>
-            </a:pPr>
-            <a:r>
-              <a:rPr lang="en-US" dirty="0"/>
-              <a:t>Continuous Integration</a:t>
-            </a:r>
-          </a:p>
-          <a:p>
-            <a:pPr lvl="1" indent="-342900">
-              <a:spcBef>
-                <a:spcPts val="0"/>
-              </a:spcBef>
-              <a:buSzPts val="1800"/>
-              <a:buChar char="●"/>
-            </a:pPr>
-            <a:r>
-              <a:rPr lang="en-US" dirty="0"/>
-              <a:t>Things such as Jenkins to build code developed by multiple concurrent engineers </a:t>
+              <a:t>The 2 primary types of deployments are in-place (or rolling) deployments and blue/green deployments. They both have their pros/cons</a:t>
             </a:r>
           </a:p>
           <a:p>
@@ -12376,20 +12068,25 @@
             </a:pPr>
             <a:r>
               <a:rPr lang="en-US" dirty="0"/>
-              <a:t>Continuous Delivery</a:t>
-            </a:r>
-          </a:p>
-          <a:p>
-            <a:pPr lvl="1" indent="-342900">
-              <a:spcBef>
-                <a:spcPts val="0"/>
-              </a:spcBef>
+              <a:t>In-place (aka rolling) deployments go through each server node (or instance) in the , remove it from the load balancer, shut down the web container/app, deploy the new code, restart the web container/app, and add it back into the load balancer. </a:t>
+            </a:r>
+          </a:p>
+          <a:p>
+            <a:pPr indent="-342900">
               <a:buSzPts val="1800"/>
-              <a:buChar char="●"/>
             </a:pPr>
             <a:r>
               <a:rPr lang="en-US" dirty="0"/>
-              <a:t>Automated code building, testing and preparing for release to production. Takes code from build -&gt; deploy</a:t>
+              <a:t>Benefit of rolling deployments is that they require only one collection of nodes for each environment (dev/staging/prod)</a:t>
+            </a:r>
+          </a:p>
+          <a:p>
+            <a:pPr indent="-342900">
+              <a:buSzPts val="1800"/>
+            </a:pPr>
+            <a:r>
+              <a:rPr lang="en-US" dirty="0"/>
+              <a:t>Downfall of rolling deployments is rollbacks (going back to previous version of code) is difficult and requires doing another rolling deployment one server at a time.</a:t>
             </a:r>
           </a:p>
           <a:p>
@@ -12398,85 +12095,11 @@
             </a:pPr>
             <a:r>
               <a:rPr lang="en-US" dirty="0"/>
-              <a:t>Build Pipelines</a:t>
-            </a:r>
-          </a:p>
-          <a:p>
-            <a:pPr lvl="1" indent="-342900">
-              <a:spcBef>
-                <a:spcPts val="0"/>
-              </a:spcBef>
-              <a:buSzPts val="1800"/>
-              <a:buChar char="●"/>
-            </a:pPr>
-            <a:r>
-              <a:rPr lang="en-US" dirty="0"/>
-              <a:t>Automated code jobs/stages, a typical pipeline would </a:t>
-            </a:r>
-            <a:r>
-              <a:rPr lang="en-US" b="1" dirty="0"/>
-              <a:t>build</a:t>
-            </a:r>
-            <a:r>
-              <a:rPr lang="en-US" dirty="0"/>
-              <a:t>, </a:t>
-            </a:r>
-            <a:r>
-              <a:rPr lang="en-US" b="1" dirty="0"/>
-              <a:t>test</a:t>
-            </a:r>
-            <a:r>
-              <a:rPr lang="en-US" dirty="0"/>
-              <a:t>, </a:t>
-            </a:r>
-            <a:r>
-              <a:rPr lang="en-US" b="1" dirty="0"/>
-              <a:t>deploy to staging</a:t>
-            </a:r>
-            <a:r>
-              <a:rPr lang="en-US" dirty="0"/>
-              <a:t>, then </a:t>
-            </a:r>
-            <a:r>
-              <a:rPr lang="en-US" b="1" dirty="0"/>
-              <a:t>deploy to production</a:t>
-            </a:r>
-            <a:r>
-              <a:rPr lang="en-US" dirty="0"/>
-              <a:t>. There are many types of pipelines, see: </a:t>
-            </a:r>
-            <a:r>
-              <a:rPr lang="en-US" dirty="0">
-                <a:hlinkClick r:id="rId3"/>
-              </a:rPr>
-              <a:t>https://docs.gitlab.com/ee/ci/pipelines/</a:t>
-            </a:r>
-            <a:endParaRPr lang="en-US" dirty="0"/>
+              <a:t>Blue/Green deployments requires two collections of nodes for each environment, one called blue, and one called green. At any given time, only ONE collection (blue or green) is live in the environment. When it’s time to deploy new code, the new code is deployed to the collection that is not live. Once the deploy is complete, the load balancer is switched to the non-live environment.</a:t>
+            </a:r>
           </a:p>
           <a:p>
             <a:pPr lvl="0" indent="-342900">
-              <a:buSzPts val="1800"/>
-            </a:pPr>
-            <a:r>
-              <a:rPr lang="en-US" dirty="0"/>
-              <a:t>Monitoring and Logging</a:t>
-            </a:r>
-          </a:p>
-          <a:p>
-            <a:pPr lvl="1" indent="-342900">
-              <a:spcBef>
-                <a:spcPts val="0"/>
-              </a:spcBef>
-              <a:buSzPts val="1800"/>
-              <a:buChar char="●"/>
-            </a:pPr>
-            <a:r>
-              <a:rPr lang="en-US" dirty="0"/>
-              <a:t>Things critical for high availability and troubleshooting; examples: Splunk, New Relic, etc.</a:t>
-            </a:r>
-          </a:p>
-          <a:p>
-            <a:pPr indent="-342900">
               <a:buSzPts val="1800"/>
             </a:pPr>
             <a:endParaRPr lang="en-US" dirty="0"/>
@@ -12486,7 +12109,7 @@
     </p:spTree>
     <p:extLst>
       <p:ext uri="{BB962C8B-B14F-4D97-AF65-F5344CB8AC3E}">
-        <p14:creationId xmlns:p14="http://schemas.microsoft.com/office/powerpoint/2010/main" val="2216305668"/>
+        <p14:creationId xmlns:p14="http://schemas.microsoft.com/office/powerpoint/2010/main" val="1499700365"/>
       </p:ext>
     </p:extLst>
   </p:cSld>
@@ -12549,7 +12172,7 @@
             </a:pPr>
             <a:r>
               <a:rPr lang="en-US" dirty="0"/>
-              <a:t>Deployments (rolling and blue/green)</a:t>
+              <a:t>Deployments (rolling and blue/green) continued…</a:t>
             </a:r>
             <a:endParaRPr dirty="0"/>
           </a:p>
@@ -12586,62 +12209,36 @@
           </a:bodyPr>
           <a:lstStyle/>
           <a:p>
-            <a:pPr marL="457200" lvl="0" indent="-342900" algn="l" rtl="0">
-              <a:spcBef>
-                <a:spcPts val="0"/>
-              </a:spcBef>
-              <a:spcAft>
-                <a:spcPts val="0"/>
-              </a:spcAft>
-              <a:buSzPts val="1800"/>
-              <a:buChar char="●"/>
-            </a:pPr>
-            <a:r>
-              <a:rPr lang="en-US" dirty="0"/>
-              <a:t>We spent all of LC101 and Liftoff (thus far) teaching you how to code, but not how to deploy</a:t>
-            </a:r>
-          </a:p>
-          <a:p>
-            <a:pPr marL="457200" lvl="0" indent="-342900" algn="l" rtl="0">
-              <a:spcBef>
-                <a:spcPts val="0"/>
-              </a:spcBef>
-              <a:spcAft>
-                <a:spcPts val="0"/>
-              </a:spcAft>
-              <a:buSzPts val="1800"/>
-              <a:buChar char="●"/>
-            </a:pPr>
-            <a:r>
-              <a:rPr lang="en-US" dirty="0"/>
-              <a:t>The 2 primary types of deployments are in-place (or rolling) deployments and blue/green deployments. They both have their pros/cons</a:t>
-            </a:r>
-          </a:p>
-          <a:p>
             <a:pPr lvl="0" indent="-342900">
               <a:buSzPts val="1800"/>
             </a:pPr>
             <a:r>
               <a:rPr lang="en-US" dirty="0"/>
-              <a:t>In-place (aka rolling) deployments go through each server node (or instance) in the , remove it from the load balancer, shut down the web container/app, deploy the new code, restart the web container/app, and add it back into the load balancer. </a:t>
-            </a:r>
-          </a:p>
-          <a:p>
-            <a:pPr indent="-342900">
-              <a:buSzPts val="1800"/>
-            </a:pPr>
+              <a:t>Blue/Green deployments requires two clusters of nodes for each environment, one called </a:t>
+            </a:r>
+            <a:r>
+              <a:rPr lang="en-US" dirty="0">
+                <a:solidFill>
+                  <a:srgbClr val="0070C0"/>
+                </a:solidFill>
+              </a:rPr>
+              <a:t>blue</a:t>
+            </a:r>
             <a:r>
               <a:rPr lang="en-US" dirty="0"/>
-              <a:t>Benefit of rolling deployments is that they require only one collection of nodes for each environment (dev/staging/prod)</a:t>
-            </a:r>
-          </a:p>
-          <a:p>
-            <a:pPr indent="-342900">
-              <a:buSzPts val="1800"/>
-            </a:pPr>
+              <a:t>, and one called </a:t>
+            </a:r>
+            <a:r>
+              <a:rPr lang="en-US" dirty="0">
+                <a:solidFill>
+                  <a:srgbClr val="00B050"/>
+                </a:solidFill>
+              </a:rPr>
+              <a:t>green</a:t>
+            </a:r>
             <a:r>
               <a:rPr lang="en-US" dirty="0"/>
-              <a:t>Downfall of rolling deployments is rollbacks (going back to previous version of code) is difficult and requires doing another rolling deployment one server at a time.</a:t>
+              <a:t>. </a:t>
             </a:r>
           </a:p>
           <a:p>
@@ -12650,7 +12247,123 @@
             </a:pPr>
             <a:r>
               <a:rPr lang="en-US" dirty="0"/>
-              <a:t>Blue/Green deployments requires two collections of nodes for each environment, one called blue, and one called green. At any given time, only ONE collection (blue or green) is live in the environment. When it’s time to deploy new code, the new code is deployed to the collection that is not live. Once the deploy is complete, the load balancer is switched to the non-live environment.</a:t>
+              <a:t>At any given time, only ONE cluster (</a:t>
+            </a:r>
+            <a:r>
+              <a:rPr lang="en-US" dirty="0">
+                <a:solidFill>
+                  <a:srgbClr val="0070C0"/>
+                </a:solidFill>
+              </a:rPr>
+              <a:t>blue</a:t>
+            </a:r>
+            <a:r>
+              <a:rPr lang="en-US" dirty="0"/>
+              <a:t> or </a:t>
+            </a:r>
+            <a:r>
+              <a:rPr lang="en-US" dirty="0">
+                <a:solidFill>
+                  <a:srgbClr val="00B050"/>
+                </a:solidFill>
+              </a:rPr>
+              <a:t>green</a:t>
+            </a:r>
+            <a:r>
+              <a:rPr lang="en-US" dirty="0"/>
+              <a:t>) is live in the environment. </a:t>
+            </a:r>
+          </a:p>
+          <a:p>
+            <a:pPr lvl="0" indent="-342900">
+              <a:buSzPts val="1800"/>
+            </a:pPr>
+            <a:r>
+              <a:rPr lang="en-US" dirty="0"/>
+              <a:t>When it’s time to deploy new code, the new code is deployed to the cluster that is </a:t>
+            </a:r>
+            <a:r>
+              <a:rPr lang="en-US" b="1" dirty="0"/>
+              <a:t>not live</a:t>
+            </a:r>
+            <a:r>
+              <a:rPr lang="en-US" dirty="0"/>
+              <a:t>. Once the deploy is complete, the load balancer is switched to the non-live cluster.</a:t>
+            </a:r>
+          </a:p>
+          <a:p>
+            <a:pPr lvl="0" indent="-342900">
+              <a:buSzPts val="1800"/>
+            </a:pPr>
+            <a:r>
+              <a:rPr lang="en-US" dirty="0"/>
+              <a:t>e.g. If we wanted to deploy code version 2.0 and </a:t>
+            </a:r>
+            <a:r>
+              <a:rPr lang="en-US" dirty="0">
+                <a:solidFill>
+                  <a:srgbClr val="00B050"/>
+                </a:solidFill>
+              </a:rPr>
+              <a:t>green</a:t>
+            </a:r>
+            <a:r>
+              <a:rPr lang="en-US" dirty="0"/>
+              <a:t> was live with code version 1.1 and </a:t>
+            </a:r>
+            <a:r>
+              <a:rPr lang="en-US" dirty="0">
+                <a:solidFill>
+                  <a:srgbClr val="0070C0"/>
+                </a:solidFill>
+              </a:rPr>
+              <a:t>blue</a:t>
+            </a:r>
+            <a:r>
+              <a:rPr lang="en-US" dirty="0"/>
+              <a:t> was not live with version 1.0, we would deploy version 2.0 to </a:t>
+            </a:r>
+            <a:r>
+              <a:rPr lang="en-US" dirty="0">
+                <a:solidFill>
+                  <a:srgbClr val="0070C0"/>
+                </a:solidFill>
+              </a:rPr>
+              <a:t>blue</a:t>
+            </a:r>
+            <a:r>
+              <a:rPr lang="en-US" dirty="0"/>
+              <a:t> and update the load balancer to make the </a:t>
+            </a:r>
+            <a:r>
+              <a:rPr lang="en-US" dirty="0">
+                <a:solidFill>
+                  <a:srgbClr val="0070C0"/>
+                </a:solidFill>
+              </a:rPr>
+              <a:t>blue</a:t>
+            </a:r>
+            <a:r>
+              <a:rPr lang="en-US" dirty="0"/>
+              <a:t> collection live.</a:t>
+            </a:r>
+          </a:p>
+          <a:p>
+            <a:pPr lvl="0" indent="-342900">
+              <a:buSzPts val="1800"/>
+            </a:pPr>
+            <a:r>
+              <a:rPr lang="en-US" dirty="0"/>
+              <a:t>Benefit of blue/green deployments is the easy rollback if the updated code proves to be a failure.</a:t>
+            </a:r>
+          </a:p>
+          <a:p>
+            <a:pPr lvl="0" indent="-342900">
+              <a:buSzPts val="1800"/>
+            </a:pPr>
+            <a:r>
+              <a:rPr lang="en-US" dirty="0"/>
+              <a:t>The downfall is the necessity of multiple clusters, which costs $$$</a:t>
             </a:r>
           </a:p>
           <a:p>
@@ -12664,7 +12377,7 @@
     </p:spTree>
     <p:extLst>
       <p:ext uri="{BB962C8B-B14F-4D97-AF65-F5344CB8AC3E}">
-        <p14:creationId xmlns:p14="http://schemas.microsoft.com/office/powerpoint/2010/main" val="1499700365"/>
+        <p14:creationId xmlns:p14="http://schemas.microsoft.com/office/powerpoint/2010/main" val="1468977908"/>
       </p:ext>
     </p:extLst>
   </p:cSld>
@@ -12727,7 +12440,7 @@
             </a:pPr>
             <a:r>
               <a:rPr lang="en-US" dirty="0"/>
-              <a:t>Deployments (rolling and blue/green) continued…</a:t>
+              <a:t>REST</a:t>
             </a:r>
             <a:endParaRPr dirty="0"/>
           </a:p>
@@ -12751,8 +12464,8 @@
         </p:nvSpPr>
         <p:spPr>
           <a:xfrm>
-            <a:off x="460950" y="1718184"/>
-            <a:ext cx="8222100" cy="3345652"/>
+            <a:off x="471900" y="1919075"/>
+            <a:ext cx="8222100" cy="2710200"/>
           </a:xfrm>
           <a:prstGeom prst="rect">
             <a:avLst/>
@@ -12764,175 +12477,179 @@
           </a:bodyPr>
           <a:lstStyle/>
           <a:p>
-            <a:pPr lvl="0" indent="-342900">
+            <a:pPr marL="457200" lvl="0" indent="-342900" algn="l" rtl="0">
+              <a:spcBef>
+                <a:spcPts val="0"/>
+              </a:spcBef>
+              <a:spcAft>
+                <a:spcPts val="0"/>
+              </a:spcAft>
               <a:buSzPts val="1800"/>
+              <a:buChar char="●"/>
             </a:pPr>
             <a:r>
               <a:rPr lang="en-US" dirty="0"/>
-              <a:t>Blue/Green deployments requires two clusters of nodes for each environment, one called </a:t>
-            </a:r>
-            <a:r>
-              <a:rPr lang="en-US" dirty="0">
-                <a:solidFill>
-                  <a:srgbClr val="0070C0"/>
-                </a:solidFill>
-              </a:rPr>
-              <a:t>blue</a:t>
+              <a:t>REST – </a:t>
+            </a:r>
+            <a:r>
+              <a:rPr lang="en-US" b="1" dirty="0"/>
+              <a:t>Re</a:t>
             </a:r>
             <a:r>
               <a:rPr lang="en-US" dirty="0"/>
-              <a:t>, and one called </a:t>
-            </a:r>
-            <a:r>
-              <a:rPr lang="en-US" dirty="0">
-                <a:solidFill>
-                  <a:srgbClr val="00B050"/>
-                </a:solidFill>
-              </a:rPr>
-              <a:t>green</a:t>
+              <a:t>presentational </a:t>
+            </a:r>
+            <a:r>
+              <a:rPr lang="en-US" b="1" dirty="0"/>
+              <a:t>S</a:t>
             </a:r>
             <a:r>
               <a:rPr lang="en-US" dirty="0"/>
-              <a:t>. </a:t>
-            </a:r>
-          </a:p>
-          <a:p>
-            <a:pPr lvl="0" indent="-342900">
+              <a:t>tate </a:t>
+            </a:r>
+            <a:r>
+              <a:rPr lang="en-US" b="1" dirty="0"/>
+              <a:t>T</a:t>
+            </a:r>
+            <a:r>
+              <a:rPr lang="en-US" dirty="0"/>
+              <a:t>ransfer</a:t>
+            </a:r>
+          </a:p>
+          <a:p>
+            <a:pPr marL="457200" lvl="0" indent="-342900" algn="l" rtl="0">
+              <a:spcBef>
+                <a:spcPts val="0"/>
+              </a:spcBef>
+              <a:spcAft>
+                <a:spcPts val="0"/>
+              </a:spcAft>
               <a:buSzPts val="1800"/>
+              <a:buChar char="●"/>
             </a:pPr>
             <a:r>
               <a:rPr lang="en-US" dirty="0"/>
-              <a:t>At any given time, only ONE cluster (</a:t>
-            </a:r>
-            <a:r>
-              <a:rPr lang="en-US" dirty="0">
-                <a:solidFill>
-                  <a:srgbClr val="0070C0"/>
-                </a:solidFill>
-              </a:rPr>
-              <a:t>blue</a:t>
-            </a:r>
+              <a:t>Some interviewers will ask you to define REST, a lot of people fail on this, they can provide examples, but fail to explain what it is.</a:t>
+            </a:r>
+          </a:p>
+          <a:p>
+            <a:pPr marL="457200" lvl="0" indent="-342900" algn="l" rtl="0">
+              <a:spcBef>
+                <a:spcPts val="0"/>
+              </a:spcBef>
+              <a:spcAft>
+                <a:spcPts val="0"/>
+              </a:spcAft>
+              <a:buSzPts val="1800"/>
+              <a:buChar char="●"/>
+            </a:pPr>
             <a:r>
               <a:rPr lang="en-US" dirty="0"/>
-              <a:t> or </a:t>
-            </a:r>
-            <a:r>
-              <a:rPr lang="en-US" dirty="0">
-                <a:solidFill>
-                  <a:srgbClr val="00B050"/>
-                </a:solidFill>
-              </a:rPr>
-              <a:t>green</a:t>
-            </a:r>
+              <a:t>REST in its simplest form is a design paradigm for web services built on top of HTTP.</a:t>
+            </a:r>
+          </a:p>
+          <a:p>
+            <a:pPr marL="457200" lvl="0" indent="-342900" algn="l" rtl="0">
+              <a:spcBef>
+                <a:spcPts val="0"/>
+              </a:spcBef>
+              <a:spcAft>
+                <a:spcPts val="0"/>
+              </a:spcAft>
+              <a:buSzPts val="1800"/>
+              <a:buChar char="●"/>
+            </a:pPr>
             <a:r>
               <a:rPr lang="en-US" dirty="0"/>
-              <a:t>) is live in the environment. </a:t>
-            </a:r>
-          </a:p>
-          <a:p>
-            <a:pPr lvl="0" indent="-342900">
+              <a:t>HTTP Verbs</a:t>
+            </a:r>
+          </a:p>
+          <a:p>
+            <a:pPr lvl="1" indent="-342900">
+              <a:spcBef>
+                <a:spcPts val="0"/>
+              </a:spcBef>
               <a:buSzPts val="1800"/>
+              <a:buChar char="●"/>
             </a:pPr>
             <a:r>
               <a:rPr lang="en-US" dirty="0"/>
-              <a:t>When it’s time to deploy new code, the new code is deployed to the cluster that is </a:t>
-            </a:r>
-            <a:r>
-              <a:rPr lang="en-US" b="1" dirty="0"/>
-              <a:t>not live</a:t>
-            </a:r>
+              <a:t>GET</a:t>
+            </a:r>
+          </a:p>
+          <a:p>
+            <a:pPr lvl="1" indent="-342900">
+              <a:spcBef>
+                <a:spcPts val="0"/>
+              </a:spcBef>
+              <a:buSzPts val="1800"/>
+              <a:buChar char="●"/>
+            </a:pPr>
             <a:r>
               <a:rPr lang="en-US" dirty="0"/>
-              <a:t>. Once the deploy is complete, the load balancer is switched to the non-live cluster.</a:t>
-            </a:r>
-          </a:p>
-          <a:p>
-            <a:pPr lvl="0" indent="-342900">
+              <a:t>POST</a:t>
+            </a:r>
+          </a:p>
+          <a:p>
+            <a:pPr lvl="1" indent="-342900">
+              <a:spcBef>
+                <a:spcPts val="0"/>
+              </a:spcBef>
               <a:buSzPts val="1800"/>
+              <a:buChar char="●"/>
             </a:pPr>
             <a:r>
               <a:rPr lang="en-US" dirty="0"/>
-              <a:t>e.g. If we wanted to deploy code version 2.0 and </a:t>
-            </a:r>
-            <a:r>
-              <a:rPr lang="en-US" dirty="0">
-                <a:solidFill>
-                  <a:srgbClr val="00B050"/>
-                </a:solidFill>
-              </a:rPr>
-              <a:t>green</a:t>
-            </a:r>
+              <a:t>PUT</a:t>
+            </a:r>
+          </a:p>
+          <a:p>
+            <a:pPr lvl="1" indent="-342900">
+              <a:spcBef>
+                <a:spcPts val="0"/>
+              </a:spcBef>
+              <a:buSzPts val="1800"/>
+              <a:buChar char="●"/>
+            </a:pPr>
             <a:r>
               <a:rPr lang="en-US" dirty="0"/>
-              <a:t> was live with code version 1.1 and </a:t>
-            </a:r>
-            <a:r>
-              <a:rPr lang="en-US" dirty="0">
-                <a:solidFill>
-                  <a:srgbClr val="0070C0"/>
-                </a:solidFill>
-              </a:rPr>
-              <a:t>blue</a:t>
-            </a:r>
+              <a:t>DELETE</a:t>
+            </a:r>
+          </a:p>
+          <a:p>
+            <a:pPr indent="-342900">
+              <a:buSzPts val="1800"/>
+            </a:pPr>
             <a:r>
               <a:rPr lang="en-US" dirty="0"/>
-              <a:t> was not live with version 1.0, we would deploy version 2.0 to </a:t>
-            </a:r>
-            <a:r>
-              <a:rPr lang="en-US" dirty="0">
-                <a:solidFill>
-                  <a:srgbClr val="0070C0"/>
-                </a:solidFill>
-              </a:rPr>
-              <a:t>blue</a:t>
-            </a:r>
-            <a:r>
-              <a:rPr lang="en-US" dirty="0"/>
-              <a:t> and update the load balancer to make the </a:t>
-            </a:r>
-            <a:r>
-              <a:rPr lang="en-US" dirty="0">
-                <a:solidFill>
-                  <a:srgbClr val="0070C0"/>
-                </a:solidFill>
-              </a:rPr>
-              <a:t>blue</a:t>
-            </a:r>
-            <a:r>
-              <a:rPr lang="en-US" dirty="0"/>
-              <a:t> collection live.</a:t>
-            </a:r>
-          </a:p>
-          <a:p>
-            <a:pPr lvl="0" indent="-342900">
+              <a:t>RESTful services should be client-server based stateless web services usually using JSON as the data type. </a:t>
+            </a:r>
+          </a:p>
+          <a:p>
+            <a:pPr indent="-342900">
               <a:buSzPts val="1800"/>
             </a:pPr>
-            <a:r>
-              <a:rPr lang="en-US" dirty="0"/>
-              <a:t>Benefit of blue/green deployments is the easy rollback if the updated code proves to be a failure.</a:t>
-            </a:r>
-          </a:p>
-          <a:p>
-            <a:pPr lvl="0" indent="-342900">
+            <a:endParaRPr lang="en-US" dirty="0"/>
+          </a:p>
+          <a:p>
+            <a:pPr marL="457200" lvl="0" indent="-342900" algn="l" rtl="0">
+              <a:spcBef>
+                <a:spcPts val="0"/>
+              </a:spcBef>
+              <a:spcAft>
+                <a:spcPts val="0"/>
+              </a:spcAft>
               <a:buSzPts val="1800"/>
-            </a:pPr>
-            <a:r>
-              <a:rPr lang="en-US" dirty="0"/>
-              <a:t>The downfall is the necessity of multiple clusters, which costs $$$</a:t>
-            </a:r>
-          </a:p>
-          <a:p>
-            <a:pPr lvl="0" indent="-342900">
-              <a:buSzPts val="1800"/>
-            </a:pPr>
-            <a:endParaRPr lang="en-US" dirty="0"/>
+              <a:buChar char="●"/>
+            </a:pPr>
+            <a:endParaRPr dirty="0"/>
           </a:p>
         </p:txBody>
       </p:sp>
     </p:spTree>
     <p:extLst>
       <p:ext uri="{BB962C8B-B14F-4D97-AF65-F5344CB8AC3E}">
-        <p14:creationId xmlns:p14="http://schemas.microsoft.com/office/powerpoint/2010/main" val="1468977908"/>
+        <p14:creationId xmlns:p14="http://schemas.microsoft.com/office/powerpoint/2010/main" val="629303076"/>
       </p:ext>
     </p:extLst>
   </p:cSld>

</xml_diff>

<commit_message>
Minor update to class 5
</commit_message>
<xml_diff>
--- a/Class 5 Slides.pptx
+++ b/Class 5 Slides.pptx
@@ -5,7 +5,7 @@
     <p:sldMasterId id="2147483659" r:id="rId1"/>
   </p:sldMasterIdLst>
   <p:notesMasterIdLst>
-    <p:notesMasterId r:id="rId17"/>
+    <p:notesMasterId r:id="rId19"/>
   </p:notesMasterIdLst>
   <p:sldIdLst>
     <p:sldId id="256" r:id="rId2"/>
@@ -13,26 +13,28 @@
     <p:sldId id="260" r:id="rId4"/>
     <p:sldId id="264" r:id="rId5"/>
     <p:sldId id="265" r:id="rId6"/>
-    <p:sldId id="266" r:id="rId7"/>
-    <p:sldId id="273" r:id="rId8"/>
-    <p:sldId id="274" r:id="rId9"/>
-    <p:sldId id="267" r:id="rId10"/>
-    <p:sldId id="268" r:id="rId11"/>
-    <p:sldId id="270" r:id="rId12"/>
-    <p:sldId id="271" r:id="rId13"/>
-    <p:sldId id="269" r:id="rId14"/>
-    <p:sldId id="272" r:id="rId15"/>
-    <p:sldId id="285" r:id="rId16"/>
+    <p:sldId id="286" r:id="rId7"/>
+    <p:sldId id="287" r:id="rId8"/>
+    <p:sldId id="266" r:id="rId9"/>
+    <p:sldId id="273" r:id="rId10"/>
+    <p:sldId id="274" r:id="rId11"/>
+    <p:sldId id="267" r:id="rId12"/>
+    <p:sldId id="268" r:id="rId13"/>
+    <p:sldId id="270" r:id="rId14"/>
+    <p:sldId id="271" r:id="rId15"/>
+    <p:sldId id="269" r:id="rId16"/>
+    <p:sldId id="272" r:id="rId17"/>
+    <p:sldId id="285" r:id="rId18"/>
   </p:sldIdLst>
   <p:sldSz cx="9144000" cy="5143500" type="screen16x9"/>
   <p:notesSz cx="6858000" cy="9144000"/>
   <p:embeddedFontLst>
     <p:embeddedFont>
       <p:font typeface="Roboto" panose="02000000000000000000" pitchFamily="2" charset="0"/>
-      <p:regular r:id="rId18"/>
-      <p:bold r:id="rId19"/>
-      <p:italic r:id="rId20"/>
-      <p:boldItalic r:id="rId21"/>
+      <p:regular r:id="rId20"/>
+      <p:bold r:id="rId21"/>
+      <p:italic r:id="rId22"/>
+      <p:boldItalic r:id="rId23"/>
     </p:embeddedFont>
   </p:embeddedFontLst>
   <p:defaultTextStyle>
@@ -920,7 +922,7 @@
     </p:spTree>
     <p:extLst>
       <p:ext uri="{BB962C8B-B14F-4D97-AF65-F5344CB8AC3E}">
-        <p14:creationId xmlns:p14="http://schemas.microsoft.com/office/powerpoint/2010/main" val="2464496078"/>
+        <p14:creationId xmlns:p14="http://schemas.microsoft.com/office/powerpoint/2010/main" val="3344032723"/>
       </p:ext>
     </p:extLst>
   </p:cSld>
@@ -1033,7 +1035,7 @@
     </p:spTree>
     <p:extLst>
       <p:ext uri="{BB962C8B-B14F-4D97-AF65-F5344CB8AC3E}">
-        <p14:creationId xmlns:p14="http://schemas.microsoft.com/office/powerpoint/2010/main" val="1670712207"/>
+        <p14:creationId xmlns:p14="http://schemas.microsoft.com/office/powerpoint/2010/main" val="3447910590"/>
       </p:ext>
     </p:extLst>
   </p:cSld>
@@ -1146,7 +1148,7 @@
     </p:spTree>
     <p:extLst>
       <p:ext uri="{BB962C8B-B14F-4D97-AF65-F5344CB8AC3E}">
-        <p14:creationId xmlns:p14="http://schemas.microsoft.com/office/powerpoint/2010/main" val="3892860880"/>
+        <p14:creationId xmlns:p14="http://schemas.microsoft.com/office/powerpoint/2010/main" val="2464496078"/>
       </p:ext>
     </p:extLst>
   </p:cSld>
@@ -1259,7 +1261,7 @@
     </p:spTree>
     <p:extLst>
       <p:ext uri="{BB962C8B-B14F-4D97-AF65-F5344CB8AC3E}">
-        <p14:creationId xmlns:p14="http://schemas.microsoft.com/office/powerpoint/2010/main" val="4225417892"/>
+        <p14:creationId xmlns:p14="http://schemas.microsoft.com/office/powerpoint/2010/main" val="1670712207"/>
       </p:ext>
     </p:extLst>
   </p:cSld>
@@ -1372,6 +1374,232 @@
     </p:spTree>
     <p:extLst>
       <p:ext uri="{BB962C8B-B14F-4D97-AF65-F5344CB8AC3E}">
+        <p14:creationId xmlns:p14="http://schemas.microsoft.com/office/powerpoint/2010/main" val="3892860880"/>
+      </p:ext>
+    </p:extLst>
+  </p:cSld>
+  <p:clrMapOvr>
+    <a:masterClrMapping/>
+  </p:clrMapOvr>
+</p:notes>
+</file>
+
+<file path=ppt/notesSlides/notesSlide15.xml><?xml version="1.0" encoding="utf-8"?>
+<p:notes xmlns:a="http://schemas.openxmlformats.org/drawingml/2006/main" xmlns:r="http://schemas.openxmlformats.org/officeDocument/2006/relationships" xmlns:p="http://schemas.openxmlformats.org/presentationml/2006/main" showMasterSp="0" showMasterPhAnim="0">
+  <p:cSld>
+    <p:spTree>
+      <p:nvGrpSpPr>
+        <p:cNvPr id="1" name="Shape 91"/>
+        <p:cNvGrpSpPr/>
+        <p:nvPr/>
+      </p:nvGrpSpPr>
+      <p:grpSpPr>
+        <a:xfrm>
+          <a:off x="0" y="0"/>
+          <a:ext cx="0" cy="0"/>
+          <a:chOff x="0" y="0"/>
+          <a:chExt cx="0" cy="0"/>
+        </a:xfrm>
+      </p:grpSpPr>
+      <p:sp>
+        <p:nvSpPr>
+          <p:cNvPr id="92" name="Google Shape;92;g3fd3056a27_0_0:notes"/>
+          <p:cNvSpPr>
+            <a:spLocks noGrp="1" noRot="1" noChangeAspect="1"/>
+          </p:cNvSpPr>
+          <p:nvPr>
+            <p:ph type="sldImg" idx="2"/>
+          </p:nvPr>
+        </p:nvSpPr>
+        <p:spPr>
+          <a:xfrm>
+            <a:off x="381000" y="685800"/>
+            <a:ext cx="6096000" cy="3429000"/>
+          </a:xfrm>
+          <a:custGeom>
+            <a:avLst/>
+            <a:gdLst/>
+            <a:ahLst/>
+            <a:cxnLst/>
+            <a:rect l="l" t="t" r="r" b="b"/>
+            <a:pathLst>
+              <a:path w="120000" h="120000" extrusionOk="0">
+                <a:moveTo>
+                  <a:pt x="0" y="0"/>
+                </a:moveTo>
+                <a:lnTo>
+                  <a:pt x="120000" y="0"/>
+                </a:lnTo>
+                <a:lnTo>
+                  <a:pt x="120000" y="120000"/>
+                </a:lnTo>
+                <a:lnTo>
+                  <a:pt x="0" y="120000"/>
+                </a:lnTo>
+                <a:close/>
+              </a:path>
+            </a:pathLst>
+          </a:custGeom>
+        </p:spPr>
+      </p:sp>
+      <p:sp>
+        <p:nvSpPr>
+          <p:cNvPr id="93" name="Google Shape;93;g3fd3056a27_0_0:notes"/>
+          <p:cNvSpPr txBox="1">
+            <a:spLocks noGrp="1"/>
+          </p:cNvSpPr>
+          <p:nvPr>
+            <p:ph type="body" idx="1"/>
+          </p:nvPr>
+        </p:nvSpPr>
+        <p:spPr>
+          <a:xfrm>
+            <a:off x="685800" y="4343400"/>
+            <a:ext cx="5486400" cy="4114800"/>
+          </a:xfrm>
+          <a:prstGeom prst="rect">
+            <a:avLst/>
+          </a:prstGeom>
+        </p:spPr>
+        <p:txBody>
+          <a:bodyPr spcFirstLastPara="1" wrap="square" lIns="91425" tIns="91425" rIns="91425" bIns="91425" anchor="t" anchorCtr="0">
+            <a:noAutofit/>
+          </a:bodyPr>
+          <a:lstStyle/>
+          <a:p>
+            <a:pPr marL="0" lvl="0" indent="0" algn="l" rtl="0">
+              <a:spcBef>
+                <a:spcPts val="0"/>
+              </a:spcBef>
+              <a:spcAft>
+                <a:spcPts val="0"/>
+              </a:spcAft>
+              <a:buNone/>
+            </a:pPr>
+            <a:r>
+              <a:rPr lang="en"/>
+              <a:t>Resume Aug 21st</a:t>
+            </a:r>
+            <a:endParaRPr/>
+          </a:p>
+        </p:txBody>
+      </p:sp>
+    </p:spTree>
+    <p:extLst>
+      <p:ext uri="{BB962C8B-B14F-4D97-AF65-F5344CB8AC3E}">
+        <p14:creationId xmlns:p14="http://schemas.microsoft.com/office/powerpoint/2010/main" val="4225417892"/>
+      </p:ext>
+    </p:extLst>
+  </p:cSld>
+  <p:clrMapOvr>
+    <a:masterClrMapping/>
+  </p:clrMapOvr>
+</p:notes>
+</file>
+
+<file path=ppt/notesSlides/notesSlide16.xml><?xml version="1.0" encoding="utf-8"?>
+<p:notes xmlns:a="http://schemas.openxmlformats.org/drawingml/2006/main" xmlns:r="http://schemas.openxmlformats.org/officeDocument/2006/relationships" xmlns:p="http://schemas.openxmlformats.org/presentationml/2006/main" showMasterSp="0" showMasterPhAnim="0">
+  <p:cSld>
+    <p:spTree>
+      <p:nvGrpSpPr>
+        <p:cNvPr id="1" name="Shape 91"/>
+        <p:cNvGrpSpPr/>
+        <p:nvPr/>
+      </p:nvGrpSpPr>
+      <p:grpSpPr>
+        <a:xfrm>
+          <a:off x="0" y="0"/>
+          <a:ext cx="0" cy="0"/>
+          <a:chOff x="0" y="0"/>
+          <a:chExt cx="0" cy="0"/>
+        </a:xfrm>
+      </p:grpSpPr>
+      <p:sp>
+        <p:nvSpPr>
+          <p:cNvPr id="92" name="Google Shape;92;g3fd3056a27_0_0:notes"/>
+          <p:cNvSpPr>
+            <a:spLocks noGrp="1" noRot="1" noChangeAspect="1"/>
+          </p:cNvSpPr>
+          <p:nvPr>
+            <p:ph type="sldImg" idx="2"/>
+          </p:nvPr>
+        </p:nvSpPr>
+        <p:spPr>
+          <a:xfrm>
+            <a:off x="381000" y="685800"/>
+            <a:ext cx="6096000" cy="3429000"/>
+          </a:xfrm>
+          <a:custGeom>
+            <a:avLst/>
+            <a:gdLst/>
+            <a:ahLst/>
+            <a:cxnLst/>
+            <a:rect l="l" t="t" r="r" b="b"/>
+            <a:pathLst>
+              <a:path w="120000" h="120000" extrusionOk="0">
+                <a:moveTo>
+                  <a:pt x="0" y="0"/>
+                </a:moveTo>
+                <a:lnTo>
+                  <a:pt x="120000" y="0"/>
+                </a:lnTo>
+                <a:lnTo>
+                  <a:pt x="120000" y="120000"/>
+                </a:lnTo>
+                <a:lnTo>
+                  <a:pt x="0" y="120000"/>
+                </a:lnTo>
+                <a:close/>
+              </a:path>
+            </a:pathLst>
+          </a:custGeom>
+        </p:spPr>
+      </p:sp>
+      <p:sp>
+        <p:nvSpPr>
+          <p:cNvPr id="93" name="Google Shape;93;g3fd3056a27_0_0:notes"/>
+          <p:cNvSpPr txBox="1">
+            <a:spLocks noGrp="1"/>
+          </p:cNvSpPr>
+          <p:nvPr>
+            <p:ph type="body" idx="1"/>
+          </p:nvPr>
+        </p:nvSpPr>
+        <p:spPr>
+          <a:xfrm>
+            <a:off x="685800" y="4343400"/>
+            <a:ext cx="5486400" cy="4114800"/>
+          </a:xfrm>
+          <a:prstGeom prst="rect">
+            <a:avLst/>
+          </a:prstGeom>
+        </p:spPr>
+        <p:txBody>
+          <a:bodyPr spcFirstLastPara="1" wrap="square" lIns="91425" tIns="91425" rIns="91425" bIns="91425" anchor="t" anchorCtr="0">
+            <a:noAutofit/>
+          </a:bodyPr>
+          <a:lstStyle/>
+          <a:p>
+            <a:pPr marL="0" lvl="0" indent="0" algn="l" rtl="0">
+              <a:spcBef>
+                <a:spcPts val="0"/>
+              </a:spcBef>
+              <a:spcAft>
+                <a:spcPts val="0"/>
+              </a:spcAft>
+              <a:buNone/>
+            </a:pPr>
+            <a:r>
+              <a:rPr lang="en"/>
+              <a:t>Resume Aug 21st</a:t>
+            </a:r>
+            <a:endParaRPr/>
+          </a:p>
+        </p:txBody>
+      </p:sp>
+    </p:spTree>
+    <p:extLst>
+      <p:ext uri="{BB962C8B-B14F-4D97-AF65-F5344CB8AC3E}">
         <p14:creationId xmlns:p14="http://schemas.microsoft.com/office/powerpoint/2010/main" val="2721490249"/>
       </p:ext>
     </p:extLst>
@@ -1382,7 +1610,7 @@
 </p:notes>
 </file>
 
-<file path=ppt/notesSlides/notesSlide15.xml><?xml version="1.0" encoding="utf-8"?>
+<file path=ppt/notesSlides/notesSlide17.xml><?xml version="1.0" encoding="utf-8"?>
 <p:notes xmlns:a="http://schemas.openxmlformats.org/drawingml/2006/main" xmlns:r="http://schemas.openxmlformats.org/officeDocument/2006/relationships" xmlns:p="http://schemas.openxmlformats.org/presentationml/2006/main" showMasterSp="0" showMasterPhAnim="0">
   <p:cSld>
     <p:spTree>
@@ -2027,7 +2255,7 @@
     </p:spTree>
     <p:extLst>
       <p:ext uri="{BB962C8B-B14F-4D97-AF65-F5344CB8AC3E}">
-        <p14:creationId xmlns:p14="http://schemas.microsoft.com/office/powerpoint/2010/main" val="2677802266"/>
+        <p14:creationId xmlns:p14="http://schemas.microsoft.com/office/powerpoint/2010/main" val="1367511037"/>
       </p:ext>
     </p:extLst>
   </p:cSld>
@@ -2140,7 +2368,7 @@
     </p:spTree>
     <p:extLst>
       <p:ext uri="{BB962C8B-B14F-4D97-AF65-F5344CB8AC3E}">
-        <p14:creationId xmlns:p14="http://schemas.microsoft.com/office/powerpoint/2010/main" val="2039510149"/>
+        <p14:creationId xmlns:p14="http://schemas.microsoft.com/office/powerpoint/2010/main" val="2475212952"/>
       </p:ext>
     </p:extLst>
   </p:cSld>
@@ -2253,7 +2481,7 @@
     </p:spTree>
     <p:extLst>
       <p:ext uri="{BB962C8B-B14F-4D97-AF65-F5344CB8AC3E}">
-        <p14:creationId xmlns:p14="http://schemas.microsoft.com/office/powerpoint/2010/main" val="3344032723"/>
+        <p14:creationId xmlns:p14="http://schemas.microsoft.com/office/powerpoint/2010/main" val="2677802266"/>
       </p:ext>
     </p:extLst>
   </p:cSld>
@@ -2366,7 +2594,7 @@
     </p:spTree>
     <p:extLst>
       <p:ext uri="{BB962C8B-B14F-4D97-AF65-F5344CB8AC3E}">
-        <p14:creationId xmlns:p14="http://schemas.microsoft.com/office/powerpoint/2010/main" val="3447910590"/>
+        <p14:creationId xmlns:p14="http://schemas.microsoft.com/office/powerpoint/2010/main" val="2039510149"/>
       </p:ext>
     </p:extLst>
   </p:cSld>
@@ -8041,7 +8269,7 @@
             </a:pPr>
             <a:r>
               <a:rPr lang="en-US" dirty="0"/>
-              <a:t>Public Clouds</a:t>
+              <a:t>Deployments (rolling and blue/green) continued…</a:t>
             </a:r>
             <a:endParaRPr dirty="0"/>
           </a:p>
@@ -8065,8 +8293,8 @@
         </p:nvSpPr>
         <p:spPr>
           <a:xfrm>
-            <a:off x="471900" y="1919075"/>
-            <a:ext cx="8222100" cy="2710200"/>
+            <a:off x="460950" y="1718184"/>
+            <a:ext cx="8222100" cy="3345652"/>
           </a:xfrm>
           <a:prstGeom prst="rect">
             <a:avLst/>
@@ -8078,146 +8306,175 @@
           </a:bodyPr>
           <a:lstStyle/>
           <a:p>
-            <a:pPr marL="457200" lvl="0" indent="-342900" algn="l" rtl="0">
-              <a:spcBef>
-                <a:spcPts val="0"/>
-              </a:spcBef>
-              <a:spcAft>
-                <a:spcPts val="0"/>
-              </a:spcAft>
+            <a:pPr lvl="0" indent="-342900">
               <a:buSzPts val="1800"/>
-              <a:buChar char="●"/>
             </a:pPr>
             <a:r>
               <a:rPr lang="en-US" dirty="0"/>
-              <a:t>You’ve probably heard of them before, AWS, Azure, GCP, etc.</a:t>
-            </a:r>
-          </a:p>
-          <a:p>
-            <a:pPr marL="457200" lvl="0" indent="-342900" algn="l" rtl="0">
-              <a:spcBef>
-                <a:spcPts val="0"/>
-              </a:spcBef>
-              <a:spcAft>
-                <a:spcPts val="0"/>
-              </a:spcAft>
+              <a:t>Blue/Green deployments requires two clusters of nodes for each environment, one called </a:t>
+            </a:r>
+            <a:r>
+              <a:rPr lang="en-US" dirty="0">
+                <a:solidFill>
+                  <a:srgbClr val="0070C0"/>
+                </a:solidFill>
+              </a:rPr>
+              <a:t>blue</a:t>
+            </a:r>
+            <a:r>
+              <a:rPr lang="en-US" dirty="0"/>
+              <a:t>, and one called </a:t>
+            </a:r>
+            <a:r>
+              <a:rPr lang="en-US" dirty="0">
+                <a:solidFill>
+                  <a:srgbClr val="00B050"/>
+                </a:solidFill>
+              </a:rPr>
+              <a:t>green</a:t>
+            </a:r>
+            <a:r>
+              <a:rPr lang="en-US" dirty="0"/>
+              <a:t>. </a:t>
+            </a:r>
+          </a:p>
+          <a:p>
+            <a:pPr lvl="0" indent="-342900">
               <a:buSzPts val="1800"/>
-              <a:buChar char="●"/>
             </a:pPr>
             <a:r>
               <a:rPr lang="en-US" dirty="0"/>
-              <a:t>These are the public clouds many companies are using to run their businesses!</a:t>
-            </a:r>
-          </a:p>
-          <a:p>
-            <a:pPr marL="457200" lvl="0" indent="-342900" algn="l" rtl="0">
-              <a:spcBef>
-                <a:spcPts val="0"/>
-              </a:spcBef>
-              <a:spcAft>
-                <a:spcPts val="0"/>
-              </a:spcAft>
+              <a:t>At any given time, only ONE cluster (</a:t>
+            </a:r>
+            <a:r>
+              <a:rPr lang="en-US" dirty="0">
+                <a:solidFill>
+                  <a:srgbClr val="0070C0"/>
+                </a:solidFill>
+              </a:rPr>
+              <a:t>blue</a:t>
+            </a:r>
+            <a:r>
+              <a:rPr lang="en-US" dirty="0"/>
+              <a:t> or </a:t>
+            </a:r>
+            <a:r>
+              <a:rPr lang="en-US" dirty="0">
+                <a:solidFill>
+                  <a:srgbClr val="00B050"/>
+                </a:solidFill>
+              </a:rPr>
+              <a:t>green</a:t>
+            </a:r>
+            <a:r>
+              <a:rPr lang="en-US" dirty="0"/>
+              <a:t>) is live in the environment. </a:t>
+            </a:r>
+          </a:p>
+          <a:p>
+            <a:pPr lvl="0" indent="-342900">
               <a:buSzPts val="1800"/>
-              <a:buChar char="●"/>
             </a:pPr>
             <a:r>
               <a:rPr lang="en-US" dirty="0"/>
-              <a:t>These public clouds provide many services at various layers including</a:t>
-            </a:r>
-          </a:p>
-          <a:p>
-            <a:pPr lvl="1" indent="-342900">
-              <a:spcBef>
-                <a:spcPts val="0"/>
-              </a:spcBef>
+              <a:t>When it’s time to deploy new code, the new code is deployed to the cluster that is </a:t>
+            </a:r>
+            <a:r>
+              <a:rPr lang="en-US" b="1" dirty="0"/>
+              <a:t>not live</a:t>
+            </a:r>
+            <a:r>
+              <a:rPr lang="en-US" dirty="0"/>
+              <a:t>. Once the deploy is complete, the load balancer is switched to the non-live cluster.</a:t>
+            </a:r>
+          </a:p>
+          <a:p>
+            <a:pPr lvl="0" indent="-342900">
               <a:buSzPts val="1800"/>
-              <a:buChar char="●"/>
             </a:pPr>
             <a:r>
               <a:rPr lang="en-US" dirty="0"/>
-              <a:t>IAAS – Infrastructure as a service – Basic building blocks of IT – Servers, network, data storage, etc.</a:t>
-            </a:r>
-          </a:p>
-          <a:p>
-            <a:pPr lvl="1" indent="-342900">
-              <a:spcBef>
-                <a:spcPts val="0"/>
-              </a:spcBef>
+              <a:t>e.g. If we wanted to deploy code version 2.0 and </a:t>
+            </a:r>
+            <a:r>
+              <a:rPr lang="en-US" dirty="0">
+                <a:solidFill>
+                  <a:srgbClr val="00B050"/>
+                </a:solidFill>
+              </a:rPr>
+              <a:t>green</a:t>
+            </a:r>
+            <a:r>
+              <a:rPr lang="en-US" dirty="0"/>
+              <a:t> was live with code version 1.1 and </a:t>
+            </a:r>
+            <a:r>
+              <a:rPr lang="en-US" dirty="0">
+                <a:solidFill>
+                  <a:srgbClr val="0070C0"/>
+                </a:solidFill>
+              </a:rPr>
+              <a:t>blue</a:t>
+            </a:r>
+            <a:r>
+              <a:rPr lang="en-US" dirty="0"/>
+              <a:t> was not live with version 1.0, we would deploy version 2.0 to </a:t>
+            </a:r>
+            <a:r>
+              <a:rPr lang="en-US" dirty="0">
+                <a:solidFill>
+                  <a:srgbClr val="0070C0"/>
+                </a:solidFill>
+              </a:rPr>
+              <a:t>blue</a:t>
+            </a:r>
+            <a:r>
+              <a:rPr lang="en-US" dirty="0"/>
+              <a:t> and update the load balancer to make the </a:t>
+            </a:r>
+            <a:r>
+              <a:rPr lang="en-US" dirty="0">
+                <a:solidFill>
+                  <a:srgbClr val="0070C0"/>
+                </a:solidFill>
+              </a:rPr>
+              <a:t>blue</a:t>
+            </a:r>
+            <a:r>
+              <a:rPr lang="en-US" dirty="0"/>
+              <a:t> collection live.</a:t>
+            </a:r>
+          </a:p>
+          <a:p>
+            <a:pPr lvl="0" indent="-342900">
               <a:buSzPts val="1800"/>
-              <a:buChar char="●"/>
             </a:pPr>
             <a:r>
               <a:rPr lang="en-US" dirty="0"/>
-              <a:t>PAAS – Platform as a service – Hardware and OS, allows for focus on deployment. No need to worry about OS level concerns (patches, </a:t>
-            </a:r>
-            <a:r>
-              <a:rPr lang="en-US" dirty="0" err="1"/>
-              <a:t>etc</a:t>
-            </a:r>
+              <a:t>Benefit of blue/green deployments is the easy rollback if the updated code proves to be a failure.</a:t>
+            </a:r>
+          </a:p>
+          <a:p>
+            <a:pPr lvl="0" indent="-342900">
+              <a:buSzPts val="1800"/>
+            </a:pPr>
             <a:r>
               <a:rPr lang="en-US" dirty="0"/>
-              <a:t>)</a:t>
-            </a:r>
-          </a:p>
-          <a:p>
-            <a:pPr lvl="1" indent="-342900">
-              <a:spcBef>
-                <a:spcPts val="0"/>
-              </a:spcBef>
+              <a:t>The downfall is the necessity of multiple clusters, which costs $$$</a:t>
+            </a:r>
+          </a:p>
+          <a:p>
+            <a:pPr lvl="0" indent="-342900">
               <a:buSzPts val="1800"/>
-              <a:buChar char="●"/>
-            </a:pPr>
-            <a:r>
-              <a:rPr lang="en-US" dirty="0"/>
-              <a:t>SAAS – Software as a service – Completed product that can be run and is managed by the cloud provider. E.g. – Web-based email</a:t>
-            </a:r>
-          </a:p>
-          <a:p>
-            <a:pPr indent="-342900">
-              <a:buSzPts val="1800"/>
-            </a:pPr>
-            <a:r>
-              <a:rPr lang="en-US" dirty="0"/>
-              <a:t>The layer of public cloud services you use will depend on your needs, as you go from IAAS -&gt; SAAS, your low-level control disappears.</a:t>
-            </a:r>
-          </a:p>
-          <a:p>
-            <a:pPr indent="-342900">
-              <a:buSzPts val="1800"/>
-            </a:pPr>
-            <a:r>
-              <a:rPr lang="en-US" dirty="0">
-                <a:hlinkClick r:id="rId3"/>
-              </a:rPr>
-              <a:t>https://aws.amazon.com/types-of-cloud-computing/</a:t>
-            </a:r>
+            </a:pPr>
             <a:endParaRPr lang="en-US" dirty="0"/>
-          </a:p>
-          <a:p>
-            <a:pPr indent="-342900">
-              <a:buSzPts val="1800"/>
-            </a:pPr>
-            <a:endParaRPr lang="en-US" dirty="0"/>
-          </a:p>
-          <a:p>
-            <a:pPr marL="457200" lvl="0" indent="-342900" algn="l" rtl="0">
-              <a:spcBef>
-                <a:spcPts val="0"/>
-              </a:spcBef>
-              <a:spcAft>
-                <a:spcPts val="0"/>
-              </a:spcAft>
-              <a:buSzPts val="1800"/>
-              <a:buChar char="●"/>
-            </a:pPr>
-            <a:endParaRPr dirty="0"/>
           </a:p>
         </p:txBody>
       </p:sp>
     </p:spTree>
     <p:extLst>
       <p:ext uri="{BB962C8B-B14F-4D97-AF65-F5344CB8AC3E}">
-        <p14:creationId xmlns:p14="http://schemas.microsoft.com/office/powerpoint/2010/main" val="1630937321"/>
+        <p14:creationId xmlns:p14="http://schemas.microsoft.com/office/powerpoint/2010/main" val="1468977908"/>
       </p:ext>
     </p:extLst>
   </p:cSld>
@@ -8280,7 +8537,7 @@
             </a:pPr>
             <a:r>
               <a:rPr lang="en-US" dirty="0"/>
-              <a:t>Containerization</a:t>
+              <a:t>REST</a:t>
             </a:r>
             <a:endParaRPr dirty="0"/>
           </a:p>
@@ -8317,6 +8574,517 @@
           </a:bodyPr>
           <a:lstStyle/>
           <a:p>
+            <a:pPr marL="457200" lvl="0" indent="-342900" algn="l" rtl="0">
+              <a:spcBef>
+                <a:spcPts val="0"/>
+              </a:spcBef>
+              <a:spcAft>
+                <a:spcPts val="0"/>
+              </a:spcAft>
+              <a:buSzPts val="1800"/>
+              <a:buChar char="●"/>
+            </a:pPr>
+            <a:r>
+              <a:rPr lang="en-US" dirty="0"/>
+              <a:t>REST – </a:t>
+            </a:r>
+            <a:r>
+              <a:rPr lang="en-US" b="1" dirty="0"/>
+              <a:t>Re</a:t>
+            </a:r>
+            <a:r>
+              <a:rPr lang="en-US" dirty="0"/>
+              <a:t>presentational </a:t>
+            </a:r>
+            <a:r>
+              <a:rPr lang="en-US" b="1" dirty="0"/>
+              <a:t>S</a:t>
+            </a:r>
+            <a:r>
+              <a:rPr lang="en-US" dirty="0"/>
+              <a:t>tate </a:t>
+            </a:r>
+            <a:r>
+              <a:rPr lang="en-US" b="1" dirty="0"/>
+              <a:t>T</a:t>
+            </a:r>
+            <a:r>
+              <a:rPr lang="en-US" dirty="0"/>
+              <a:t>ransfer</a:t>
+            </a:r>
+          </a:p>
+          <a:p>
+            <a:pPr marL="457200" lvl="0" indent="-342900" algn="l" rtl="0">
+              <a:spcBef>
+                <a:spcPts val="0"/>
+              </a:spcBef>
+              <a:spcAft>
+                <a:spcPts val="0"/>
+              </a:spcAft>
+              <a:buSzPts val="1800"/>
+              <a:buChar char="●"/>
+            </a:pPr>
+            <a:r>
+              <a:rPr lang="en-US" dirty="0"/>
+              <a:t>Some interviewers will ask you to define REST, a lot of people fail on this, they can provide examples, but fail to explain what it is.</a:t>
+            </a:r>
+          </a:p>
+          <a:p>
+            <a:pPr marL="457200" lvl="0" indent="-342900" algn="l" rtl="0">
+              <a:spcBef>
+                <a:spcPts val="0"/>
+              </a:spcBef>
+              <a:spcAft>
+                <a:spcPts val="0"/>
+              </a:spcAft>
+              <a:buSzPts val="1800"/>
+              <a:buChar char="●"/>
+            </a:pPr>
+            <a:r>
+              <a:rPr lang="en-US" dirty="0"/>
+              <a:t>REST in its simplest form is a design paradigm for web services built on top of HTTP.</a:t>
+            </a:r>
+          </a:p>
+          <a:p>
+            <a:pPr marL="457200" lvl="0" indent="-342900" algn="l" rtl="0">
+              <a:spcBef>
+                <a:spcPts val="0"/>
+              </a:spcBef>
+              <a:spcAft>
+                <a:spcPts val="0"/>
+              </a:spcAft>
+              <a:buSzPts val="1800"/>
+              <a:buChar char="●"/>
+            </a:pPr>
+            <a:r>
+              <a:rPr lang="en-US" dirty="0"/>
+              <a:t>HTTP Verbs</a:t>
+            </a:r>
+          </a:p>
+          <a:p>
+            <a:pPr lvl="1" indent="-342900">
+              <a:spcBef>
+                <a:spcPts val="0"/>
+              </a:spcBef>
+              <a:buSzPts val="1800"/>
+              <a:buChar char="●"/>
+            </a:pPr>
+            <a:r>
+              <a:rPr lang="en-US" dirty="0"/>
+              <a:t>GET</a:t>
+            </a:r>
+          </a:p>
+          <a:p>
+            <a:pPr lvl="1" indent="-342900">
+              <a:spcBef>
+                <a:spcPts val="0"/>
+              </a:spcBef>
+              <a:buSzPts val="1800"/>
+              <a:buChar char="●"/>
+            </a:pPr>
+            <a:r>
+              <a:rPr lang="en-US" dirty="0"/>
+              <a:t>POST</a:t>
+            </a:r>
+          </a:p>
+          <a:p>
+            <a:pPr lvl="1" indent="-342900">
+              <a:spcBef>
+                <a:spcPts val="0"/>
+              </a:spcBef>
+              <a:buSzPts val="1800"/>
+              <a:buChar char="●"/>
+            </a:pPr>
+            <a:r>
+              <a:rPr lang="en-US" dirty="0"/>
+              <a:t>PUT</a:t>
+            </a:r>
+          </a:p>
+          <a:p>
+            <a:pPr lvl="1" indent="-342900">
+              <a:spcBef>
+                <a:spcPts val="0"/>
+              </a:spcBef>
+              <a:buSzPts val="1800"/>
+              <a:buChar char="●"/>
+            </a:pPr>
+            <a:r>
+              <a:rPr lang="en-US" dirty="0"/>
+              <a:t>DELETE</a:t>
+            </a:r>
+          </a:p>
+          <a:p>
+            <a:pPr indent="-342900">
+              <a:buSzPts val="1800"/>
+            </a:pPr>
+            <a:r>
+              <a:rPr lang="en-US" dirty="0"/>
+              <a:t>RESTful services should be client-server based stateless web services usually using JSON as the data type. </a:t>
+            </a:r>
+          </a:p>
+          <a:p>
+            <a:pPr indent="-342900">
+              <a:buSzPts val="1800"/>
+            </a:pPr>
+            <a:endParaRPr lang="en-US" dirty="0"/>
+          </a:p>
+          <a:p>
+            <a:pPr marL="457200" lvl="0" indent="-342900" algn="l" rtl="0">
+              <a:spcBef>
+                <a:spcPts val="0"/>
+              </a:spcBef>
+              <a:spcAft>
+                <a:spcPts val="0"/>
+              </a:spcAft>
+              <a:buSzPts val="1800"/>
+              <a:buChar char="●"/>
+            </a:pPr>
+            <a:endParaRPr dirty="0"/>
+          </a:p>
+        </p:txBody>
+      </p:sp>
+    </p:spTree>
+    <p:extLst>
+      <p:ext uri="{BB962C8B-B14F-4D97-AF65-F5344CB8AC3E}">
+        <p14:creationId xmlns:p14="http://schemas.microsoft.com/office/powerpoint/2010/main" val="629303076"/>
+      </p:ext>
+    </p:extLst>
+  </p:cSld>
+  <p:clrMapOvr>
+    <a:masterClrMapping/>
+  </p:clrMapOvr>
+</p:sld>
+</file>
+
+<file path=ppt/slides/slide12.xml><?xml version="1.0" encoding="utf-8"?>
+<p:sld xmlns:a="http://schemas.openxmlformats.org/drawingml/2006/main" xmlns:r="http://schemas.openxmlformats.org/officeDocument/2006/relationships" xmlns:p="http://schemas.openxmlformats.org/presentationml/2006/main">
+  <p:cSld>
+    <p:spTree>
+      <p:nvGrpSpPr>
+        <p:cNvPr id="1" name="Shape 94"/>
+        <p:cNvGrpSpPr/>
+        <p:nvPr/>
+      </p:nvGrpSpPr>
+      <p:grpSpPr>
+        <a:xfrm>
+          <a:off x="0" y="0"/>
+          <a:ext cx="0" cy="0"/>
+          <a:chOff x="0" y="0"/>
+          <a:chExt cx="0" cy="0"/>
+        </a:xfrm>
+      </p:grpSpPr>
+      <p:sp>
+        <p:nvSpPr>
+          <p:cNvPr id="95" name="Google Shape;95;p17"/>
+          <p:cNvSpPr txBox="1">
+            <a:spLocks noGrp="1"/>
+          </p:cNvSpPr>
+          <p:nvPr>
+            <p:ph type="title"/>
+          </p:nvPr>
+        </p:nvSpPr>
+        <p:spPr>
+          <a:xfrm>
+            <a:off x="471900" y="738725"/>
+            <a:ext cx="8222100" cy="767700"/>
+          </a:xfrm>
+          <a:prstGeom prst="rect">
+            <a:avLst/>
+          </a:prstGeom>
+        </p:spPr>
+        <p:txBody>
+          <a:bodyPr spcFirstLastPara="1" wrap="square" lIns="91425" tIns="91425" rIns="91425" bIns="91425" anchor="b" anchorCtr="0">
+            <a:noAutofit/>
+          </a:bodyPr>
+          <a:lstStyle/>
+          <a:p>
+            <a:pPr marL="0" lvl="0" indent="0" algn="l" rtl="0">
+              <a:spcBef>
+                <a:spcPts val="0"/>
+              </a:spcBef>
+              <a:spcAft>
+                <a:spcPts val="0"/>
+              </a:spcAft>
+              <a:buNone/>
+            </a:pPr>
+            <a:r>
+              <a:rPr lang="en-US" dirty="0"/>
+              <a:t>Public Clouds</a:t>
+            </a:r>
+            <a:endParaRPr dirty="0"/>
+          </a:p>
+        </p:txBody>
+      </p:sp>
+      <p:sp>
+        <p:nvSpPr>
+          <p:cNvPr id="31" name="Google Shape;89;p16">
+            <a:extLst>
+              <a:ext uri="{FF2B5EF4-FFF2-40B4-BE49-F238E27FC236}">
+                <a16:creationId xmlns:a16="http://schemas.microsoft.com/office/drawing/2014/main" id="{67E34750-AD08-E94A-B9F8-33F50EC2B699}"/>
+              </a:ext>
+            </a:extLst>
+          </p:cNvPr>
+          <p:cNvSpPr txBox="1">
+            <a:spLocks noGrp="1"/>
+          </p:cNvSpPr>
+          <p:nvPr>
+            <p:ph type="body" idx="1"/>
+          </p:nvPr>
+        </p:nvSpPr>
+        <p:spPr>
+          <a:xfrm>
+            <a:off x="471900" y="1919075"/>
+            <a:ext cx="8222100" cy="2710200"/>
+          </a:xfrm>
+          <a:prstGeom prst="rect">
+            <a:avLst/>
+          </a:prstGeom>
+        </p:spPr>
+        <p:txBody>
+          <a:bodyPr spcFirstLastPara="1" wrap="square" lIns="91425" tIns="91425" rIns="91425" bIns="91425" anchor="t" anchorCtr="0">
+            <a:noAutofit/>
+          </a:bodyPr>
+          <a:lstStyle/>
+          <a:p>
+            <a:pPr marL="457200" lvl="0" indent="-342900" algn="l" rtl="0">
+              <a:spcBef>
+                <a:spcPts val="0"/>
+              </a:spcBef>
+              <a:spcAft>
+                <a:spcPts val="0"/>
+              </a:spcAft>
+              <a:buSzPts val="1800"/>
+              <a:buChar char="●"/>
+            </a:pPr>
+            <a:r>
+              <a:rPr lang="en-US" dirty="0"/>
+              <a:t>You’ve probably heard of them before, AWS, Azure, GCP, etc.</a:t>
+            </a:r>
+          </a:p>
+          <a:p>
+            <a:pPr marL="457200" lvl="0" indent="-342900" algn="l" rtl="0">
+              <a:spcBef>
+                <a:spcPts val="0"/>
+              </a:spcBef>
+              <a:spcAft>
+                <a:spcPts val="0"/>
+              </a:spcAft>
+              <a:buSzPts val="1800"/>
+              <a:buChar char="●"/>
+            </a:pPr>
+            <a:r>
+              <a:rPr lang="en-US" dirty="0"/>
+              <a:t>These are the public clouds many companies are using to run their businesses!</a:t>
+            </a:r>
+          </a:p>
+          <a:p>
+            <a:pPr marL="457200" lvl="0" indent="-342900" algn="l" rtl="0">
+              <a:spcBef>
+                <a:spcPts val="0"/>
+              </a:spcBef>
+              <a:spcAft>
+                <a:spcPts val="0"/>
+              </a:spcAft>
+              <a:buSzPts val="1800"/>
+              <a:buChar char="●"/>
+            </a:pPr>
+            <a:r>
+              <a:rPr lang="en-US" dirty="0"/>
+              <a:t>These public clouds provide many services at various layers including</a:t>
+            </a:r>
+          </a:p>
+          <a:p>
+            <a:pPr lvl="1" indent="-342900">
+              <a:spcBef>
+                <a:spcPts val="0"/>
+              </a:spcBef>
+              <a:buSzPts val="1800"/>
+              <a:buChar char="●"/>
+            </a:pPr>
+            <a:r>
+              <a:rPr lang="en-US" dirty="0"/>
+              <a:t>IAAS – Infrastructure as a service – Basic building blocks of IT – Servers, network, data storage, etc.</a:t>
+            </a:r>
+          </a:p>
+          <a:p>
+            <a:pPr lvl="1" indent="-342900">
+              <a:spcBef>
+                <a:spcPts val="0"/>
+              </a:spcBef>
+              <a:buSzPts val="1800"/>
+              <a:buChar char="●"/>
+            </a:pPr>
+            <a:r>
+              <a:rPr lang="en-US" dirty="0"/>
+              <a:t>PAAS – Platform as a service – Hardware and OS, allows for focus on deployment. No need to worry about OS level concerns (patches, </a:t>
+            </a:r>
+            <a:r>
+              <a:rPr lang="en-US" dirty="0" err="1"/>
+              <a:t>etc</a:t>
+            </a:r>
+            <a:r>
+              <a:rPr lang="en-US" dirty="0"/>
+              <a:t>)</a:t>
+            </a:r>
+          </a:p>
+          <a:p>
+            <a:pPr lvl="1" indent="-342900">
+              <a:spcBef>
+                <a:spcPts val="0"/>
+              </a:spcBef>
+              <a:buSzPts val="1800"/>
+              <a:buChar char="●"/>
+            </a:pPr>
+            <a:r>
+              <a:rPr lang="en-US" dirty="0"/>
+              <a:t>SAAS – Software as a service – Completed product that can be run and is managed by the cloud provider. E.g. – Web-based email</a:t>
+            </a:r>
+          </a:p>
+          <a:p>
+            <a:pPr indent="-342900">
+              <a:buSzPts val="1800"/>
+            </a:pPr>
+            <a:r>
+              <a:rPr lang="en-US" dirty="0"/>
+              <a:t>The layer of public cloud services you use will depend on your needs, as you go from IAAS -&gt; SAAS, your low-level control disappears.</a:t>
+            </a:r>
+          </a:p>
+          <a:p>
+            <a:pPr indent="-342900">
+              <a:buSzPts val="1800"/>
+            </a:pPr>
+            <a:r>
+              <a:rPr lang="en-US" dirty="0">
+                <a:hlinkClick r:id="rId3"/>
+              </a:rPr>
+              <a:t>https://aws.amazon.com/types-of-cloud-computing/</a:t>
+            </a:r>
+            <a:endParaRPr lang="en-US" dirty="0"/>
+          </a:p>
+          <a:p>
+            <a:pPr indent="-342900">
+              <a:buSzPts val="1800"/>
+            </a:pPr>
+            <a:endParaRPr lang="en-US" dirty="0"/>
+          </a:p>
+          <a:p>
+            <a:pPr marL="457200" lvl="0" indent="-342900" algn="l" rtl="0">
+              <a:spcBef>
+                <a:spcPts val="0"/>
+              </a:spcBef>
+              <a:spcAft>
+                <a:spcPts val="0"/>
+              </a:spcAft>
+              <a:buSzPts val="1800"/>
+              <a:buChar char="●"/>
+            </a:pPr>
+            <a:endParaRPr dirty="0"/>
+          </a:p>
+        </p:txBody>
+      </p:sp>
+    </p:spTree>
+    <p:extLst>
+      <p:ext uri="{BB962C8B-B14F-4D97-AF65-F5344CB8AC3E}">
+        <p14:creationId xmlns:p14="http://schemas.microsoft.com/office/powerpoint/2010/main" val="1630937321"/>
+      </p:ext>
+    </p:extLst>
+  </p:cSld>
+  <p:clrMapOvr>
+    <a:masterClrMapping/>
+  </p:clrMapOvr>
+</p:sld>
+</file>
+
+<file path=ppt/slides/slide13.xml><?xml version="1.0" encoding="utf-8"?>
+<p:sld xmlns:a="http://schemas.openxmlformats.org/drawingml/2006/main" xmlns:r="http://schemas.openxmlformats.org/officeDocument/2006/relationships" xmlns:p="http://schemas.openxmlformats.org/presentationml/2006/main">
+  <p:cSld>
+    <p:spTree>
+      <p:nvGrpSpPr>
+        <p:cNvPr id="1" name="Shape 94"/>
+        <p:cNvGrpSpPr/>
+        <p:nvPr/>
+      </p:nvGrpSpPr>
+      <p:grpSpPr>
+        <a:xfrm>
+          <a:off x="0" y="0"/>
+          <a:ext cx="0" cy="0"/>
+          <a:chOff x="0" y="0"/>
+          <a:chExt cx="0" cy="0"/>
+        </a:xfrm>
+      </p:grpSpPr>
+      <p:sp>
+        <p:nvSpPr>
+          <p:cNvPr id="95" name="Google Shape;95;p17"/>
+          <p:cNvSpPr txBox="1">
+            <a:spLocks noGrp="1"/>
+          </p:cNvSpPr>
+          <p:nvPr>
+            <p:ph type="title"/>
+          </p:nvPr>
+        </p:nvSpPr>
+        <p:spPr>
+          <a:xfrm>
+            <a:off x="471900" y="738725"/>
+            <a:ext cx="8222100" cy="767700"/>
+          </a:xfrm>
+          <a:prstGeom prst="rect">
+            <a:avLst/>
+          </a:prstGeom>
+        </p:spPr>
+        <p:txBody>
+          <a:bodyPr spcFirstLastPara="1" wrap="square" lIns="91425" tIns="91425" rIns="91425" bIns="91425" anchor="b" anchorCtr="0">
+            <a:noAutofit/>
+          </a:bodyPr>
+          <a:lstStyle/>
+          <a:p>
+            <a:pPr marL="0" lvl="0" indent="0" algn="l" rtl="0">
+              <a:spcBef>
+                <a:spcPts val="0"/>
+              </a:spcBef>
+              <a:spcAft>
+                <a:spcPts val="0"/>
+              </a:spcAft>
+              <a:buNone/>
+            </a:pPr>
+            <a:r>
+              <a:rPr lang="en-US" dirty="0"/>
+              <a:t>Containerization</a:t>
+            </a:r>
+            <a:endParaRPr dirty="0"/>
+          </a:p>
+        </p:txBody>
+      </p:sp>
+      <p:sp>
+        <p:nvSpPr>
+          <p:cNvPr id="31" name="Google Shape;89;p16">
+            <a:extLst>
+              <a:ext uri="{FF2B5EF4-FFF2-40B4-BE49-F238E27FC236}">
+                <a16:creationId xmlns:a16="http://schemas.microsoft.com/office/drawing/2014/main" id="{67E34750-AD08-E94A-B9F8-33F50EC2B699}"/>
+              </a:ext>
+            </a:extLst>
+          </p:cNvPr>
+          <p:cNvSpPr txBox="1">
+            <a:spLocks noGrp="1"/>
+          </p:cNvSpPr>
+          <p:nvPr>
+            <p:ph type="body" idx="1"/>
+          </p:nvPr>
+        </p:nvSpPr>
+        <p:spPr>
+          <a:xfrm>
+            <a:off x="471900" y="1919075"/>
+            <a:ext cx="8222100" cy="2710200"/>
+          </a:xfrm>
+          <a:prstGeom prst="rect">
+            <a:avLst/>
+          </a:prstGeom>
+        </p:spPr>
+        <p:txBody>
+          <a:bodyPr spcFirstLastPara="1" wrap="square" lIns="91425" tIns="91425" rIns="91425" bIns="91425" anchor="t" anchorCtr="0">
+            <a:noAutofit/>
+          </a:bodyPr>
+          <a:lstStyle/>
+          <a:p>
             <a:pPr indent="-342900">
               <a:buSzPts val="1800"/>
             </a:pPr>
@@ -8417,7 +9185,7 @@
 </p:sld>
 </file>
 
-<file path=ppt/slides/slide12.xml><?xml version="1.0" encoding="utf-8"?>
+<file path=ppt/slides/slide14.xml><?xml version="1.0" encoding="utf-8"?>
 <p:sld xmlns:a="http://schemas.openxmlformats.org/drawingml/2006/main" xmlns:r="http://schemas.openxmlformats.org/officeDocument/2006/relationships" xmlns:p="http://schemas.openxmlformats.org/presentationml/2006/main">
   <p:cSld>
     <p:spTree>
@@ -8845,7 +9613,7 @@
 </p:sld>
 </file>
 
-<file path=ppt/slides/slide13.xml><?xml version="1.0" encoding="utf-8"?>
+<file path=ppt/slides/slide15.xml><?xml version="1.0" encoding="utf-8"?>
 <p:sld xmlns:a="http://schemas.openxmlformats.org/drawingml/2006/main" xmlns:r="http://schemas.openxmlformats.org/officeDocument/2006/relationships" xmlns:p="http://schemas.openxmlformats.org/presentationml/2006/main">
   <p:cSld>
     <p:spTree>
@@ -9037,7 +9805,7 @@
 </p:sld>
 </file>
 
-<file path=ppt/slides/slide14.xml><?xml version="1.0" encoding="utf-8"?>
+<file path=ppt/slides/slide16.xml><?xml version="1.0" encoding="utf-8"?>
 <p:sld xmlns:a="http://schemas.openxmlformats.org/drawingml/2006/main" xmlns:r="http://schemas.openxmlformats.org/officeDocument/2006/relationships" xmlns:p="http://schemas.openxmlformats.org/presentationml/2006/main">
   <p:cSld>
     <p:spTree>
@@ -9244,7 +10012,7 @@
 </p:sld>
 </file>
 
-<file path=ppt/slides/slide15.xml><?xml version="1.0" encoding="utf-8"?>
+<file path=ppt/slides/slide17.xml><?xml version="1.0" encoding="utf-8"?>
 <p:sld xmlns:a="http://schemas.openxmlformats.org/drawingml/2006/main" xmlns:r="http://schemas.openxmlformats.org/officeDocument/2006/relationships" xmlns:p="http://schemas.openxmlformats.org/presentationml/2006/main">
   <p:cSld>
     <p:spTree>
@@ -11619,10 +12387,16 @@
               <a:buSzPts val="1800"/>
             </a:pPr>
             <a:r>
+              <a:rPr lang="en-US" b="1" dirty="0">
+                <a:sym typeface="Wingdings" pitchFamily="2" charset="2"/>
+              </a:rPr>
+              <a:t>Note</a:t>
+            </a:r>
+            <a:r>
               <a:rPr lang="en-US" dirty="0">
                 <a:sym typeface="Wingdings" pitchFamily="2" charset="2"/>
               </a:rPr>
-              <a:t>Note: </a:t>
+              <a:t>: </a:t>
             </a:r>
             <a:r>
               <a:rPr lang="en-US" dirty="0"/>
@@ -11721,7 +12495,7 @@
             </a:pPr>
             <a:r>
               <a:rPr lang="en-US" dirty="0"/>
-              <a:t>DevOps</a:t>
+              <a:t>Datastores (bases) SQL vs NoSQL</a:t>
             </a:r>
             <a:endParaRPr dirty="0"/>
           </a:p>
@@ -11758,180 +12532,54 @@
           </a:bodyPr>
           <a:lstStyle/>
           <a:p>
-            <a:pPr marL="457200" lvl="0" indent="-342900" algn="l" rtl="0">
-              <a:spcBef>
-                <a:spcPts val="0"/>
-              </a:spcBef>
-              <a:spcAft>
-                <a:spcPts val="0"/>
-              </a:spcAft>
-              <a:buSzPts val="1800"/>
-              <a:buChar char="●"/>
-            </a:pPr>
+            <a:r>
+              <a:rPr lang="en-US" dirty="0"/>
+              <a:t>SQL databases are table-based, while NoSQL databases are document, key-value, graph, or wide-column stores. </a:t>
+            </a:r>
+          </a:p>
+          <a:p>
             <a:endParaRPr lang="en-US" dirty="0"/>
           </a:p>
           <a:p>
-            <a:pPr marL="457200" lvl="0" indent="-342900" algn="l" rtl="0">
-              <a:spcBef>
-                <a:spcPts val="0"/>
-              </a:spcBef>
-              <a:spcAft>
-                <a:spcPts val="0"/>
-              </a:spcAft>
-              <a:buSzPts val="1800"/>
-              <a:buChar char="●"/>
-            </a:pPr>
             <a:r>
               <a:rPr lang="en-US" dirty="0"/>
-              <a:t>DevOps -&gt; Development Operations; philosophies, practices, and tools that help to deliver software/services to users more efficiently.</a:t>
-            </a:r>
-          </a:p>
-          <a:p>
-            <a:pPr marL="457200" lvl="0" indent="-342900" algn="l" rtl="0">
-              <a:spcBef>
-                <a:spcPts val="0"/>
-              </a:spcBef>
-              <a:spcAft>
-                <a:spcPts val="0"/>
-              </a:spcAft>
-              <a:buSzPts val="1800"/>
-              <a:buChar char="●"/>
-            </a:pPr>
+              <a:t>SQL databases are better for multi-row transactions</a:t>
+            </a:r>
+          </a:p>
+          <a:p>
+            <a:endParaRPr lang="en-US" dirty="0"/>
+          </a:p>
+          <a:p>
             <a:r>
               <a:rPr lang="en-US" dirty="0"/>
-              <a:t>Continuous Integration</a:t>
-            </a:r>
-          </a:p>
-          <a:p>
-            <a:pPr lvl="1" indent="-342900">
-              <a:spcBef>
-                <a:spcPts val="0"/>
-              </a:spcBef>
-              <a:buSzPts val="1800"/>
-              <a:buChar char="●"/>
-            </a:pPr>
+              <a:t>NoSQL is better for unstructured data like documents or JSON</a:t>
+            </a:r>
+          </a:p>
+          <a:p>
+            <a:endParaRPr lang="en-US" dirty="0"/>
+          </a:p>
+          <a:p>
             <a:r>
               <a:rPr lang="en-US" dirty="0"/>
-              <a:t>Things such as Jenkins to build code developed by multiple concurrent engineers </a:t>
-            </a:r>
-          </a:p>
-          <a:p>
-            <a:pPr lvl="0" indent="-342900">
-              <a:buSzPts val="1800"/>
-            </a:pPr>
-            <a:r>
+              <a:t>NoSQL has a dynamic schema vs SQLs static schema</a:t>
+            </a:r>
+            <a:br>
               <a:rPr lang="en-US" dirty="0"/>
-              <a:t>Continuous Delivery</a:t>
-            </a:r>
-          </a:p>
-          <a:p>
-            <a:pPr lvl="1" indent="-342900">
-              <a:spcBef>
-                <a:spcPts val="0"/>
-              </a:spcBef>
-              <a:buSzPts val="1800"/>
-              <a:buChar char="●"/>
-            </a:pPr>
+            </a:br>
+            <a:endParaRPr lang="en-US" dirty="0"/>
+          </a:p>
+          <a:p>
             <a:r>
               <a:rPr lang="en-US" dirty="0"/>
-              <a:t>Automated code building, testing and preparing for release to production. Takes code from build -&gt; deploy</a:t>
-            </a:r>
-          </a:p>
-          <a:p>
-            <a:pPr lvl="0" indent="-342900">
-              <a:buSzPts val="1800"/>
-            </a:pPr>
-            <a:r>
-              <a:rPr lang="en-US" dirty="0"/>
-              <a:t>Build Pipelines</a:t>
-            </a:r>
-          </a:p>
-          <a:p>
-            <a:pPr lvl="1" indent="-342900">
-              <a:spcBef>
-                <a:spcPts val="0"/>
-              </a:spcBef>
-              <a:buSzPts val="1800"/>
-              <a:buChar char="●"/>
-            </a:pPr>
-            <a:r>
-              <a:rPr lang="en-US" dirty="0"/>
-              <a:t>Automated code jobs/stages, a typical pipeline would </a:t>
-            </a:r>
-            <a:r>
-              <a:rPr lang="en-US" b="1" dirty="0"/>
-              <a:t>build</a:t>
-            </a:r>
-            <a:r>
-              <a:rPr lang="en-US" dirty="0"/>
-              <a:t>, </a:t>
-            </a:r>
-            <a:r>
-              <a:rPr lang="en-US" b="1" dirty="0"/>
-              <a:t>test</a:t>
-            </a:r>
-            <a:r>
-              <a:rPr lang="en-US" dirty="0"/>
-              <a:t>, </a:t>
-            </a:r>
-            <a:r>
-              <a:rPr lang="en-US" b="1" dirty="0"/>
-              <a:t>deploy to staging</a:t>
-            </a:r>
-            <a:r>
-              <a:rPr lang="en-US" dirty="0"/>
-              <a:t>, then </a:t>
-            </a:r>
-            <a:r>
-              <a:rPr lang="en-US" b="1" dirty="0"/>
-              <a:t>deploy to production</a:t>
-            </a:r>
-            <a:r>
-              <a:rPr lang="en-US" dirty="0"/>
-              <a:t>. There are many types of pipelines, see: </a:t>
-            </a:r>
-            <a:r>
-              <a:rPr lang="en-US" dirty="0">
-                <a:hlinkClick r:id="rId3"/>
-              </a:rPr>
-              <a:t>https://docs.gitlab.com/ee/ci/pipelines/</a:t>
-            </a:r>
-            <a:endParaRPr lang="en-US" dirty="0"/>
-          </a:p>
-          <a:p>
-            <a:pPr lvl="0" indent="-342900">
-              <a:buSzPts val="1800"/>
-            </a:pPr>
-            <a:r>
-              <a:rPr lang="en-US" dirty="0"/>
-              <a:t>Monitoring and Logging</a:t>
-            </a:r>
-          </a:p>
-          <a:p>
-            <a:pPr lvl="1" indent="-342900">
-              <a:spcBef>
-                <a:spcPts val="0"/>
-              </a:spcBef>
-              <a:buSzPts val="1800"/>
-              <a:buChar char="●"/>
-            </a:pPr>
-            <a:r>
-              <a:rPr lang="en-US" dirty="0"/>
-              <a:t>Things critical for high availability and troubleshooting; examples: Splunk, New Relic, etc.</a:t>
-            </a:r>
-          </a:p>
-          <a:p>
-            <a:pPr indent="-342900">
-              <a:buSzPts val="1800"/>
-            </a:pPr>
-            <a:endParaRPr lang="en-US" dirty="0"/>
+              <a:t>NoSQL works best for companies that are going through rapid growth stages or those with a lot of unstructured data</a:t>
+            </a:r>
           </a:p>
         </p:txBody>
       </p:sp>
     </p:spTree>
     <p:extLst>
       <p:ext uri="{BB962C8B-B14F-4D97-AF65-F5344CB8AC3E}">
-        <p14:creationId xmlns:p14="http://schemas.microsoft.com/office/powerpoint/2010/main" val="2216305668"/>
+        <p14:creationId xmlns:p14="http://schemas.microsoft.com/office/powerpoint/2010/main" val="3937585087"/>
       </p:ext>
     </p:extLst>
   </p:cSld>
@@ -11994,122 +12642,236 @@
             </a:pPr>
             <a:r>
               <a:rPr lang="en-US" dirty="0"/>
-              <a:t>Deployments (rolling and blue/green)</a:t>
+              <a:t>Datastores (bases) SQL vs NoSQL</a:t>
             </a:r>
             <a:endParaRPr dirty="0"/>
           </a:p>
         </p:txBody>
       </p:sp>
-      <p:sp>
-        <p:nvSpPr>
-          <p:cNvPr id="31" name="Google Shape;89;p16">
+      <p:graphicFrame>
+        <p:nvGraphicFramePr>
+          <p:cNvPr id="2" name="Table 2">
             <a:extLst>
               <a:ext uri="{FF2B5EF4-FFF2-40B4-BE49-F238E27FC236}">
-                <a16:creationId xmlns:a16="http://schemas.microsoft.com/office/drawing/2014/main" id="{67E34750-AD08-E94A-B9F8-33F50EC2B699}"/>
+                <a16:creationId xmlns:a16="http://schemas.microsoft.com/office/drawing/2014/main" id="{66680B0D-F9CD-2E41-8FF7-D1A5C71BEE42}"/>
               </a:ext>
             </a:extLst>
           </p:cNvPr>
-          <p:cNvSpPr txBox="1">
-            <a:spLocks noGrp="1"/>
-          </p:cNvSpPr>
+          <p:cNvGraphicFramePr>
+            <a:graphicFrameLocks noGrp="1"/>
+          </p:cNvGraphicFramePr>
           <p:nvPr>
-            <p:ph type="body" idx="1"/>
+            <p:extLst>
+              <p:ext uri="{D42A27DB-BD31-4B8C-83A1-F6EECF244321}">
+                <p14:modId xmlns:p14="http://schemas.microsoft.com/office/powerpoint/2010/main" val="882659858"/>
+              </p:ext>
+            </p:extLst>
           </p:nvPr>
-        </p:nvSpPr>
-        <p:spPr>
-          <a:xfrm>
-            <a:off x="460950" y="1718184"/>
-            <a:ext cx="8222100" cy="3345652"/>
-          </a:xfrm>
-          <a:prstGeom prst="rect">
-            <a:avLst/>
-          </a:prstGeom>
-        </p:spPr>
-        <p:txBody>
-          <a:bodyPr spcFirstLastPara="1" wrap="square" lIns="91425" tIns="91425" rIns="91425" bIns="91425" anchor="t" anchorCtr="0">
-            <a:noAutofit/>
-          </a:bodyPr>
-          <a:lstStyle/>
-          <a:p>
-            <a:pPr marL="457200" lvl="0" indent="-342900" algn="l" rtl="0">
-              <a:spcBef>
-                <a:spcPts val="0"/>
-              </a:spcBef>
-              <a:spcAft>
-                <a:spcPts val="0"/>
-              </a:spcAft>
-              <a:buSzPts val="1800"/>
-              <a:buChar char="●"/>
-            </a:pPr>
-            <a:r>
-              <a:rPr lang="en-US" dirty="0"/>
-              <a:t>We spent all of LC101 and Liftoff (thus far) teaching you how to code, but not how to deploy</a:t>
-            </a:r>
-          </a:p>
-          <a:p>
-            <a:pPr marL="457200" lvl="0" indent="-342900" algn="l" rtl="0">
-              <a:spcBef>
-                <a:spcPts val="0"/>
-              </a:spcBef>
-              <a:spcAft>
-                <a:spcPts val="0"/>
-              </a:spcAft>
-              <a:buSzPts val="1800"/>
-              <a:buChar char="●"/>
-            </a:pPr>
-            <a:r>
-              <a:rPr lang="en-US" dirty="0"/>
-              <a:t>The 2 primary types of deployments are in-place (or rolling) deployments and blue/green deployments. They both have their pros/cons</a:t>
-            </a:r>
-          </a:p>
-          <a:p>
-            <a:pPr lvl="0" indent="-342900">
-              <a:buSzPts val="1800"/>
-            </a:pPr>
-            <a:r>
-              <a:rPr lang="en-US" dirty="0"/>
-              <a:t>In-place (aka rolling) deployments go through each server node (or instance) in the , remove it from the load balancer, shut down the web container/app, deploy the new code, restart the web container/app, and add it back into the load balancer. </a:t>
-            </a:r>
-          </a:p>
-          <a:p>
-            <a:pPr indent="-342900">
-              <a:buSzPts val="1800"/>
-            </a:pPr>
-            <a:r>
-              <a:rPr lang="en-US" dirty="0"/>
-              <a:t>Benefit of rolling deployments is that they require only one collection of nodes for each environment (dev/staging/prod)</a:t>
-            </a:r>
-          </a:p>
-          <a:p>
-            <a:pPr indent="-342900">
-              <a:buSzPts val="1800"/>
-            </a:pPr>
-            <a:r>
-              <a:rPr lang="en-US" dirty="0"/>
-              <a:t>Downfall of rolling deployments is rollbacks (going back to previous version of code) is difficult and requires doing another rolling deployment one server at a time.</a:t>
-            </a:r>
-          </a:p>
-          <a:p>
-            <a:pPr lvl="0" indent="-342900">
-              <a:buSzPts val="1800"/>
-            </a:pPr>
-            <a:r>
-              <a:rPr lang="en-US" dirty="0"/>
-              <a:t>Blue/Green deployments requires two collections of nodes for each environment, one called blue, and one called green. At any given time, only ONE collection (blue or green) is live in the environment. When it’s time to deploy new code, the new code is deployed to the collection that is not live. Once the deploy is complete, the load balancer is switched to the non-live environment.</a:t>
-            </a:r>
-          </a:p>
-          <a:p>
-            <a:pPr lvl="0" indent="-342900">
-              <a:buSzPts val="1800"/>
-            </a:pPr>
-            <a:endParaRPr lang="en-US" dirty="0"/>
-          </a:p>
-        </p:txBody>
-      </p:sp>
+        </p:nvGraphicFramePr>
+        <p:xfrm>
+          <a:off x="1396252" y="2092886"/>
+          <a:ext cx="6096000" cy="1854200"/>
+        </p:xfrm>
+        <a:graphic>
+          <a:graphicData uri="http://schemas.openxmlformats.org/drawingml/2006/table">
+            <a:tbl>
+              <a:tblPr firstRow="1" bandRow="1">
+                <a:tableStyleId>{5C22544A-7EE6-4342-B048-85BDC9FD1C3A}</a:tableStyleId>
+              </a:tblPr>
+              <a:tblGrid>
+                <a:gridCol w="3048000">
+                  <a:extLst>
+                    <a:ext uri="{9D8B030D-6E8A-4147-A177-3AD203B41FA5}">
+                      <a16:colId xmlns:a16="http://schemas.microsoft.com/office/drawing/2014/main" val="2458983483"/>
+                    </a:ext>
+                  </a:extLst>
+                </a:gridCol>
+                <a:gridCol w="3048000">
+                  <a:extLst>
+                    <a:ext uri="{9D8B030D-6E8A-4147-A177-3AD203B41FA5}">
+                      <a16:colId xmlns:a16="http://schemas.microsoft.com/office/drawing/2014/main" val="1749862441"/>
+                    </a:ext>
+                  </a:extLst>
+                </a:gridCol>
+              </a:tblGrid>
+              <a:tr h="370840">
+                <a:tc>
+                  <a:txBody>
+                    <a:bodyPr/>
+                    <a:lstStyle/>
+                    <a:p>
+                      <a:pPr algn="ctr"/>
+                      <a:r>
+                        <a:rPr lang="en-US" dirty="0"/>
+                        <a:t>SQL</a:t>
+                      </a:r>
+                    </a:p>
+                  </a:txBody>
+                  <a:tcPr/>
+                </a:tc>
+                <a:tc>
+                  <a:txBody>
+                    <a:bodyPr/>
+                    <a:lstStyle/>
+                    <a:p>
+                      <a:pPr algn="ctr"/>
+                      <a:r>
+                        <a:rPr lang="en-US" dirty="0"/>
+                        <a:t>NoSQL</a:t>
+                      </a:r>
+                    </a:p>
+                  </a:txBody>
+                  <a:tcPr/>
+                </a:tc>
+                <a:extLst>
+                  <a:ext uri="{0D108BD9-81ED-4DB2-BD59-A6C34878D82A}">
+                    <a16:rowId xmlns:a16="http://schemas.microsoft.com/office/drawing/2014/main" val="3625050503"/>
+                  </a:ext>
+                </a:extLst>
+              </a:tr>
+              <a:tr h="370840">
+                <a:tc>
+                  <a:txBody>
+                    <a:bodyPr/>
+                    <a:lstStyle/>
+                    <a:p>
+                      <a:pPr algn="ctr"/>
+                      <a:r>
+                        <a:rPr lang="en-US" dirty="0"/>
+                        <a:t>MySQL</a:t>
+                      </a:r>
+                    </a:p>
+                  </a:txBody>
+                  <a:tcPr/>
+                </a:tc>
+                <a:tc>
+                  <a:txBody>
+                    <a:bodyPr/>
+                    <a:lstStyle/>
+                    <a:p>
+                      <a:pPr algn="ctr"/>
+                      <a:r>
+                        <a:rPr lang="en-US" dirty="0"/>
+                        <a:t>MongoDB</a:t>
+                      </a:r>
+                    </a:p>
+                  </a:txBody>
+                  <a:tcPr/>
+                </a:tc>
+                <a:extLst>
+                  <a:ext uri="{0D108BD9-81ED-4DB2-BD59-A6C34878D82A}">
+                    <a16:rowId xmlns:a16="http://schemas.microsoft.com/office/drawing/2014/main" val="1263875908"/>
+                  </a:ext>
+                </a:extLst>
+              </a:tr>
+              <a:tr h="370840">
+                <a:tc>
+                  <a:txBody>
+                    <a:bodyPr/>
+                    <a:lstStyle/>
+                    <a:p>
+                      <a:pPr algn="ctr"/>
+                      <a:r>
+                        <a:rPr lang="en-US" dirty="0"/>
+                        <a:t>Oracle</a:t>
+                      </a:r>
+                    </a:p>
+                  </a:txBody>
+                  <a:tcPr/>
+                </a:tc>
+                <a:tc>
+                  <a:txBody>
+                    <a:bodyPr/>
+                    <a:lstStyle/>
+                    <a:p>
+                      <a:pPr algn="ctr"/>
+                      <a:r>
+                        <a:rPr lang="en-US" dirty="0"/>
+                        <a:t>CouchDB</a:t>
+                      </a:r>
+                    </a:p>
+                  </a:txBody>
+                  <a:tcPr/>
+                </a:tc>
+                <a:extLst>
+                  <a:ext uri="{0D108BD9-81ED-4DB2-BD59-A6C34878D82A}">
+                    <a16:rowId xmlns:a16="http://schemas.microsoft.com/office/drawing/2014/main" val="3614238275"/>
+                  </a:ext>
+                </a:extLst>
+              </a:tr>
+              <a:tr h="370840">
+                <a:tc>
+                  <a:txBody>
+                    <a:bodyPr/>
+                    <a:lstStyle/>
+                    <a:p>
+                      <a:pPr algn="ctr"/>
+                      <a:r>
+                        <a:rPr lang="en-US" dirty="0"/>
+                        <a:t>Microsoft SQL Server</a:t>
+                      </a:r>
+                    </a:p>
+                  </a:txBody>
+                  <a:tcPr/>
+                </a:tc>
+                <a:tc>
+                  <a:txBody>
+                    <a:bodyPr/>
+                    <a:lstStyle/>
+                    <a:p>
+                      <a:pPr algn="ctr"/>
+                      <a:endParaRPr lang="en-US" dirty="0"/>
+                    </a:p>
+                  </a:txBody>
+                  <a:tcPr/>
+                </a:tc>
+                <a:extLst>
+                  <a:ext uri="{0D108BD9-81ED-4DB2-BD59-A6C34878D82A}">
+                    <a16:rowId xmlns:a16="http://schemas.microsoft.com/office/drawing/2014/main" val="998496567"/>
+                  </a:ext>
+                </a:extLst>
+              </a:tr>
+              <a:tr h="370840">
+                <a:tc>
+                  <a:txBody>
+                    <a:bodyPr/>
+                    <a:lstStyle/>
+                    <a:p>
+                      <a:pPr algn="ctr"/>
+                      <a:r>
+                        <a:rPr lang="en-US" dirty="0" err="1"/>
+                        <a:t>PostgresSQL</a:t>
+                      </a:r>
+                      <a:endParaRPr lang="en-US" dirty="0"/>
+                    </a:p>
+                  </a:txBody>
+                  <a:tcPr/>
+                </a:tc>
+                <a:tc>
+                  <a:txBody>
+                    <a:bodyPr/>
+                    <a:lstStyle/>
+                    <a:p>
+                      <a:pPr algn="ctr"/>
+                      <a:endParaRPr lang="en-US" dirty="0"/>
+                    </a:p>
+                  </a:txBody>
+                  <a:tcPr/>
+                </a:tc>
+                <a:extLst>
+                  <a:ext uri="{0D108BD9-81ED-4DB2-BD59-A6C34878D82A}">
+                    <a16:rowId xmlns:a16="http://schemas.microsoft.com/office/drawing/2014/main" val="766916732"/>
+                  </a:ext>
+                </a:extLst>
+              </a:tr>
+            </a:tbl>
+          </a:graphicData>
+        </a:graphic>
+      </p:graphicFrame>
     </p:spTree>
     <p:extLst>
       <p:ext uri="{BB962C8B-B14F-4D97-AF65-F5344CB8AC3E}">
-        <p14:creationId xmlns:p14="http://schemas.microsoft.com/office/powerpoint/2010/main" val="1499700365"/>
+        <p14:creationId xmlns:p14="http://schemas.microsoft.com/office/powerpoint/2010/main" val="2924582161"/>
       </p:ext>
     </p:extLst>
   </p:cSld>
@@ -12172,7 +12934,7 @@
             </a:pPr>
             <a:r>
               <a:rPr lang="en-US" dirty="0"/>
-              <a:t>Deployments (rolling and blue/green) continued…</a:t>
+              <a:t>DevOps</a:t>
             </a:r>
             <a:endParaRPr dirty="0"/>
           </a:p>
@@ -12197,7 +12959,7 @@
         <p:spPr>
           <a:xfrm>
             <a:off x="460950" y="1718184"/>
-            <a:ext cx="8222100" cy="3345652"/>
+            <a:ext cx="8222100" cy="3172470"/>
           </a:xfrm>
           <a:prstGeom prst="rect">
             <a:avLst/>
@@ -12209,36 +12971,83 @@
           </a:bodyPr>
           <a:lstStyle/>
           <a:p>
+            <a:pPr marL="457200" lvl="0" indent="-342900" algn="l" rtl="0">
+              <a:spcBef>
+                <a:spcPts val="0"/>
+              </a:spcBef>
+              <a:spcAft>
+                <a:spcPts val="0"/>
+              </a:spcAft>
+              <a:buSzPts val="1800"/>
+              <a:buChar char="●"/>
+            </a:pPr>
+            <a:endParaRPr lang="en-US" dirty="0"/>
+          </a:p>
+          <a:p>
+            <a:pPr marL="457200" lvl="0" indent="-342900" algn="l" rtl="0">
+              <a:spcBef>
+                <a:spcPts val="0"/>
+              </a:spcBef>
+              <a:spcAft>
+                <a:spcPts val="0"/>
+              </a:spcAft>
+              <a:buSzPts val="1800"/>
+              <a:buChar char="●"/>
+            </a:pPr>
+            <a:r>
+              <a:rPr lang="en-US" dirty="0"/>
+              <a:t>DevOps -&gt; Development Operations; philosophies, practices, and tools that help to deliver software/services to users more efficiently.</a:t>
+            </a:r>
+          </a:p>
+          <a:p>
+            <a:pPr marL="457200" lvl="0" indent="-342900" algn="l" rtl="0">
+              <a:spcBef>
+                <a:spcPts val="0"/>
+              </a:spcBef>
+              <a:spcAft>
+                <a:spcPts val="0"/>
+              </a:spcAft>
+              <a:buSzPts val="1800"/>
+              <a:buChar char="●"/>
+            </a:pPr>
+            <a:r>
+              <a:rPr lang="en-US" dirty="0"/>
+              <a:t>Continuous Integration</a:t>
+            </a:r>
+          </a:p>
+          <a:p>
+            <a:pPr lvl="1" indent="-342900">
+              <a:spcBef>
+                <a:spcPts val="0"/>
+              </a:spcBef>
+              <a:buSzPts val="1800"/>
+              <a:buChar char="●"/>
+            </a:pPr>
+            <a:r>
+              <a:rPr lang="en-US" dirty="0"/>
+              <a:t>Things such as Jenkins to build code developed by multiple concurrent engineers </a:t>
+            </a:r>
+          </a:p>
+          <a:p>
             <a:pPr lvl="0" indent="-342900">
               <a:buSzPts val="1800"/>
             </a:pPr>
             <a:r>
               <a:rPr lang="en-US" dirty="0"/>
-              <a:t>Blue/Green deployments requires two clusters of nodes for each environment, one called </a:t>
-            </a:r>
-            <a:r>
-              <a:rPr lang="en-US" dirty="0">
-                <a:solidFill>
-                  <a:srgbClr val="0070C0"/>
-                </a:solidFill>
-              </a:rPr>
-              <a:t>blue</a:t>
-            </a:r>
+              <a:t>Continuous Delivery</a:t>
+            </a:r>
+          </a:p>
+          <a:p>
+            <a:pPr lvl="1" indent="-342900">
+              <a:spcBef>
+                <a:spcPts val="0"/>
+              </a:spcBef>
+              <a:buSzPts val="1800"/>
+              <a:buChar char="●"/>
+            </a:pPr>
             <a:r>
               <a:rPr lang="en-US" dirty="0"/>
-              <a:t>, and one called </a:t>
-            </a:r>
-            <a:r>
-              <a:rPr lang="en-US" dirty="0">
-                <a:solidFill>
-                  <a:srgbClr val="00B050"/>
-                </a:solidFill>
-              </a:rPr>
-              <a:t>green</a:t>
-            </a:r>
-            <a:r>
-              <a:rPr lang="en-US" dirty="0"/>
-              <a:t>. </a:t>
+              <a:t>Automated code building, testing and preparing for release to production. Takes code from build -&gt; deploy</a:t>
             </a:r>
           </a:p>
           <a:p>
@@ -12247,32 +13056,60 @@
             </a:pPr>
             <a:r>
               <a:rPr lang="en-US" dirty="0"/>
-              <a:t>At any given time, only ONE cluster (</a:t>
+              <a:t>Build Pipelines</a:t>
+            </a:r>
+          </a:p>
+          <a:p>
+            <a:pPr lvl="1" indent="-342900">
+              <a:spcBef>
+                <a:spcPts val="0"/>
+              </a:spcBef>
+              <a:buSzPts val="1800"/>
+              <a:buChar char="●"/>
+            </a:pPr>
+            <a:r>
+              <a:rPr lang="en-US" dirty="0"/>
+              <a:t>Automated code jobs/stages, a typical pipeline would </a:t>
+            </a:r>
+            <a:r>
+              <a:rPr lang="en-US" b="1" dirty="0"/>
+              <a:t>build</a:t>
+            </a:r>
+            <a:r>
+              <a:rPr lang="en-US" dirty="0"/>
+              <a:t>, </a:t>
+            </a:r>
+            <a:r>
+              <a:rPr lang="en-US" b="1" dirty="0"/>
+              <a:t>test</a:t>
+            </a:r>
+            <a:r>
+              <a:rPr lang="en-US" dirty="0"/>
+              <a:t>, </a:t>
+            </a:r>
+            <a:r>
+              <a:rPr lang="en-US" b="1" dirty="0"/>
+              <a:t>deploy to staging</a:t>
+            </a:r>
+            <a:r>
+              <a:rPr lang="en-US" dirty="0"/>
+              <a:t>, then </a:t>
+            </a:r>
+            <a:r>
+              <a:rPr lang="en-US" b="1" dirty="0"/>
+              <a:t>deploy to production</a:t>
+            </a:r>
+            <a:r>
+              <a:rPr lang="en-US" dirty="0"/>
+              <a:t>. There are many types of pipelines, see: </a:t>
             </a:r>
             <a:r>
               <a:rPr lang="en-US" dirty="0">
-                <a:solidFill>
-                  <a:srgbClr val="0070C0"/>
-                </a:solidFill>
+                <a:hlinkClick r:id="rId3"/>
               </a:rPr>
-              <a:t>blue</a:t>
-            </a:r>
-            <a:r>
-              <a:rPr lang="en-US" dirty="0"/>
-              <a:t> or </a:t>
-            </a:r>
-            <a:r>
-              <a:rPr lang="en-US" dirty="0">
-                <a:solidFill>
-                  <a:srgbClr val="00B050"/>
-                </a:solidFill>
-              </a:rPr>
-              <a:t>green</a:t>
-            </a:r>
-            <a:r>
-              <a:rPr lang="en-US" dirty="0"/>
-              <a:t>) is live in the environment. </a:t>
-            </a:r>
+              <a:t>https://docs.gitlab.com/ee/ci/pipelines/</a:t>
+            </a:r>
+            <a:endParaRPr lang="en-US" dirty="0"/>
           </a:p>
           <a:p>
             <a:pPr lvl="0" indent="-342900">
@@ -12280,94 +13117,24 @@
             </a:pPr>
             <a:r>
               <a:rPr lang="en-US" dirty="0"/>
-              <a:t>When it’s time to deploy new code, the new code is deployed to the cluster that is </a:t>
-            </a:r>
-            <a:r>
-              <a:rPr lang="en-US" b="1" dirty="0"/>
-              <a:t>not live</a:t>
-            </a:r>
+              <a:t>Monitoring and Logging</a:t>
+            </a:r>
+          </a:p>
+          <a:p>
+            <a:pPr lvl="1" indent="-342900">
+              <a:spcBef>
+                <a:spcPts val="0"/>
+              </a:spcBef>
+              <a:buSzPts val="1800"/>
+              <a:buChar char="●"/>
+            </a:pPr>
             <a:r>
               <a:rPr lang="en-US" dirty="0"/>
-              <a:t>. Once the deploy is complete, the load balancer is switched to the non-live cluster.</a:t>
-            </a:r>
-          </a:p>
-          <a:p>
-            <a:pPr lvl="0" indent="-342900">
-              <a:buSzPts val="1800"/>
-            </a:pPr>
-            <a:r>
-              <a:rPr lang="en-US" dirty="0"/>
-              <a:t>e.g. If we wanted to deploy code version 2.0 and </a:t>
-            </a:r>
-            <a:r>
-              <a:rPr lang="en-US" dirty="0">
-                <a:solidFill>
-                  <a:srgbClr val="00B050"/>
-                </a:solidFill>
-              </a:rPr>
-              <a:t>green</a:t>
-            </a:r>
-            <a:r>
-              <a:rPr lang="en-US" dirty="0"/>
-              <a:t> was live with code version 1.1 and </a:t>
-            </a:r>
-            <a:r>
-              <a:rPr lang="en-US" dirty="0">
-                <a:solidFill>
-                  <a:srgbClr val="0070C0"/>
-                </a:solidFill>
-              </a:rPr>
-              <a:t>blue</a:t>
-            </a:r>
-            <a:r>
-              <a:rPr lang="en-US" dirty="0"/>
-              <a:t> was not live with version 1.0, we would deploy version 2.0 to </a:t>
-            </a:r>
-            <a:r>
-              <a:rPr lang="en-US" dirty="0">
-                <a:solidFill>
-                  <a:srgbClr val="0070C0"/>
-                </a:solidFill>
-              </a:rPr>
-              <a:t>blue</a:t>
-            </a:r>
-            <a:r>
-              <a:rPr lang="en-US" dirty="0"/>
-              <a:t> and update the load balancer to make the </a:t>
-            </a:r>
-            <a:r>
-              <a:rPr lang="en-US" dirty="0">
-                <a:solidFill>
-                  <a:srgbClr val="0070C0"/>
-                </a:solidFill>
-              </a:rPr>
-              <a:t>blue</a:t>
-            </a:r>
-            <a:r>
-              <a:rPr lang="en-US" dirty="0"/>
-              <a:t> collection live.</a:t>
-            </a:r>
-          </a:p>
-          <a:p>
-            <a:pPr lvl="0" indent="-342900">
-              <a:buSzPts val="1800"/>
-            </a:pPr>
-            <a:r>
-              <a:rPr lang="en-US" dirty="0"/>
-              <a:t>Benefit of blue/green deployments is the easy rollback if the updated code proves to be a failure.</a:t>
-            </a:r>
-          </a:p>
-          <a:p>
-            <a:pPr lvl="0" indent="-342900">
-              <a:buSzPts val="1800"/>
-            </a:pPr>
-            <a:r>
-              <a:rPr lang="en-US" dirty="0"/>
-              <a:t>The downfall is the necessity of multiple clusters, which costs $$$</a:t>
-            </a:r>
-          </a:p>
-          <a:p>
-            <a:pPr lvl="0" indent="-342900">
+              <a:t>Things critical for high availability and troubleshooting; examples: Splunk, New Relic, etc.</a:t>
+            </a:r>
+          </a:p>
+          <a:p>
+            <a:pPr indent="-342900">
               <a:buSzPts val="1800"/>
             </a:pPr>
             <a:endParaRPr lang="en-US" dirty="0"/>
@@ -12377,7 +13144,7 @@
     </p:spTree>
     <p:extLst>
       <p:ext uri="{BB962C8B-B14F-4D97-AF65-F5344CB8AC3E}">
-        <p14:creationId xmlns:p14="http://schemas.microsoft.com/office/powerpoint/2010/main" val="1468977908"/>
+        <p14:creationId xmlns:p14="http://schemas.microsoft.com/office/powerpoint/2010/main" val="2216305668"/>
       </p:ext>
     </p:extLst>
   </p:cSld>
@@ -12440,7 +13207,7 @@
             </a:pPr>
             <a:r>
               <a:rPr lang="en-US" dirty="0"/>
-              <a:t>REST</a:t>
+              <a:t>Deployments (rolling and blue/green)</a:t>
             </a:r>
             <a:endParaRPr dirty="0"/>
           </a:p>
@@ -12464,8 +13231,8 @@
         </p:nvSpPr>
         <p:spPr>
           <a:xfrm>
-            <a:off x="471900" y="1919075"/>
-            <a:ext cx="8222100" cy="2710200"/>
+            <a:off x="460950" y="1718184"/>
+            <a:ext cx="8222100" cy="3345652"/>
           </a:xfrm>
           <a:prstGeom prst="rect">
             <a:avLst/>
@@ -12489,31 +13256,7 @@
             </a:pPr>
             <a:r>
               <a:rPr lang="en-US" dirty="0"/>
-              <a:t>REST – </a:t>
-            </a:r>
-            <a:r>
-              <a:rPr lang="en-US" b="1" dirty="0"/>
-              <a:t>Re</a:t>
-            </a:r>
-            <a:r>
-              <a:rPr lang="en-US" dirty="0"/>
-              <a:t>presentational </a:t>
-            </a:r>
-            <a:r>
-              <a:rPr lang="en-US" b="1" dirty="0"/>
-              <a:t>S</a:t>
-            </a:r>
-            <a:r>
-              <a:rPr lang="en-US" dirty="0"/>
-              <a:t>tate </a:t>
-            </a:r>
-            <a:r>
-              <a:rPr lang="en-US" b="1" dirty="0"/>
-              <a:t>T</a:t>
-            </a:r>
-            <a:r>
-              <a:rPr lang="en-US" dirty="0"/>
-              <a:t>ransfer</a:t>
+              <a:t>We spent all of LC101 and Liftoff (thus far) teaching you how to code, but not how to deploy</a:t>
             </a:r>
           </a:p>
           <a:p>
@@ -12529,91 +13272,16 @@
             </a:pPr>
             <a:r>
               <a:rPr lang="en-US" dirty="0"/>
-              <a:t>Some interviewers will ask you to define REST, a lot of people fail on this, they can provide examples, but fail to explain what it is.</a:t>
-            </a:r>
-          </a:p>
-          <a:p>
-            <a:pPr marL="457200" lvl="0" indent="-342900" algn="l" rtl="0">
-              <a:spcBef>
-                <a:spcPts val="0"/>
-              </a:spcBef>
-              <a:spcAft>
-                <a:spcPts val="0"/>
-              </a:spcAft>
+              <a:t>The 2 primary types of deployments are in-place (or rolling) deployments and blue/green deployments. They both have their pros/cons</a:t>
+            </a:r>
+          </a:p>
+          <a:p>
+            <a:pPr lvl="0" indent="-342900">
               <a:buSzPts val="1800"/>
-              <a:buChar char="●"/>
             </a:pPr>
             <a:r>
               <a:rPr lang="en-US" dirty="0"/>
-              <a:t>REST in its simplest form is a design paradigm for web services built on top of HTTP.</a:t>
-            </a:r>
-          </a:p>
-          <a:p>
-            <a:pPr marL="457200" lvl="0" indent="-342900" algn="l" rtl="0">
-              <a:spcBef>
-                <a:spcPts val="0"/>
-              </a:spcBef>
-              <a:spcAft>
-                <a:spcPts val="0"/>
-              </a:spcAft>
-              <a:buSzPts val="1800"/>
-              <a:buChar char="●"/>
-            </a:pPr>
-            <a:r>
-              <a:rPr lang="en-US" dirty="0"/>
-              <a:t>HTTP Verbs</a:t>
-            </a:r>
-          </a:p>
-          <a:p>
-            <a:pPr lvl="1" indent="-342900">
-              <a:spcBef>
-                <a:spcPts val="0"/>
-              </a:spcBef>
-              <a:buSzPts val="1800"/>
-              <a:buChar char="●"/>
-            </a:pPr>
-            <a:r>
-              <a:rPr lang="en-US" dirty="0"/>
-              <a:t>GET</a:t>
-            </a:r>
-          </a:p>
-          <a:p>
-            <a:pPr lvl="1" indent="-342900">
-              <a:spcBef>
-                <a:spcPts val="0"/>
-              </a:spcBef>
-              <a:buSzPts val="1800"/>
-              <a:buChar char="●"/>
-            </a:pPr>
-            <a:r>
-              <a:rPr lang="en-US" dirty="0"/>
-              <a:t>POST</a:t>
-            </a:r>
-          </a:p>
-          <a:p>
-            <a:pPr lvl="1" indent="-342900">
-              <a:spcBef>
-                <a:spcPts val="0"/>
-              </a:spcBef>
-              <a:buSzPts val="1800"/>
-              <a:buChar char="●"/>
-            </a:pPr>
-            <a:r>
-              <a:rPr lang="en-US" dirty="0"/>
-              <a:t>PUT</a:t>
-            </a:r>
-          </a:p>
-          <a:p>
-            <a:pPr lvl="1" indent="-342900">
-              <a:spcBef>
-                <a:spcPts val="0"/>
-              </a:spcBef>
-              <a:buSzPts val="1800"/>
-              <a:buChar char="●"/>
-            </a:pPr>
-            <a:r>
-              <a:rPr lang="en-US" dirty="0"/>
-              <a:t>DELETE</a:t>
+              <a:t>In-place (aka rolling) deployments go through each server node (or instance) in the , remove it from the load balancer, shut down the web container/app, deploy the new code, restart the web container/app, and add it back into the load balancer. </a:t>
             </a:r>
           </a:p>
           <a:p>
@@ -12622,34 +13290,39 @@
             </a:pPr>
             <a:r>
               <a:rPr lang="en-US" dirty="0"/>
-              <a:t>RESTful services should be client-server based stateless web services usually using JSON as the data type. </a:t>
+              <a:t>Benefit of rolling deployments is that they require only one collection of nodes for each environment (dev/staging/prod)</a:t>
             </a:r>
           </a:p>
           <a:p>
             <a:pPr indent="-342900">
               <a:buSzPts val="1800"/>
             </a:pPr>
+            <a:r>
+              <a:rPr lang="en-US" dirty="0"/>
+              <a:t>Downfall of rolling deployments is rollbacks (going back to previous version of code) is difficult and requires doing another rolling deployment one server at a time.</a:t>
+            </a:r>
+          </a:p>
+          <a:p>
+            <a:pPr lvl="0" indent="-342900">
+              <a:buSzPts val="1800"/>
+            </a:pPr>
+            <a:r>
+              <a:rPr lang="en-US" dirty="0"/>
+              <a:t>Blue/Green deployments requires two collections of nodes for each environment, one called blue, and one called green. At any given time, only ONE collection (blue or green) is live in the environment. When it’s time to deploy new code, the new code is deployed to the collection that is not live. Once the deploy is complete, the load balancer is switched to the non-live environment.</a:t>
+            </a:r>
+          </a:p>
+          <a:p>
+            <a:pPr lvl="0" indent="-342900">
+              <a:buSzPts val="1800"/>
+            </a:pPr>
             <a:endParaRPr lang="en-US" dirty="0"/>
-          </a:p>
-          <a:p>
-            <a:pPr marL="457200" lvl="0" indent="-342900" algn="l" rtl="0">
-              <a:spcBef>
-                <a:spcPts val="0"/>
-              </a:spcBef>
-              <a:spcAft>
-                <a:spcPts val="0"/>
-              </a:spcAft>
-              <a:buSzPts val="1800"/>
-              <a:buChar char="●"/>
-            </a:pPr>
-            <a:endParaRPr dirty="0"/>
           </a:p>
         </p:txBody>
       </p:sp>
     </p:spTree>
     <p:extLst>
       <p:ext uri="{BB962C8B-B14F-4D97-AF65-F5344CB8AC3E}">
-        <p14:creationId xmlns:p14="http://schemas.microsoft.com/office/powerpoint/2010/main" val="629303076"/>
+        <p14:creationId xmlns:p14="http://schemas.microsoft.com/office/powerpoint/2010/main" val="1499700365"/>
       </p:ext>
     </p:extLst>
   </p:cSld>

</xml_diff>